<commit_message>
Atualizando a base do para remover o picpay
</commit_message>
<xml_diff>
--- a/stuff/template_de_slides/tema-live-de-python-3-4.pptx
+++ b/stuff/template_de_slides/tema-live-de-python-3-4.pptx
@@ -725,7 +725,7 @@
   <p:cSld>
     <p:spTree>
       <p:nvGrpSpPr>
-        <p:cNvPr id="119" name="Shape 119"/>
+        <p:cNvPr id="122" name="Shape 122"/>
         <p:cNvGrpSpPr/>
         <p:nvPr/>
       </p:nvGrpSpPr>
@@ -739,7 +739,7 @@
       </p:grpSpPr>
       <p:sp>
         <p:nvSpPr>
-          <p:cNvPr id="120" name="Google Shape;120;p:notes"/>
+          <p:cNvPr id="123" name="Google Shape;123;p:notes"/>
           <p:cNvSpPr/>
           <p:nvPr>
             <p:ph idx="2" type="sldImg"/>
@@ -774,7 +774,7 @@
       </p:sp>
       <p:sp>
         <p:nvSpPr>
-          <p:cNvPr id="121" name="Google Shape;121;p:notes"/>
+          <p:cNvPr id="124" name="Google Shape;124;p:notes"/>
           <p:cNvSpPr txBox="1"/>
           <p:nvPr>
             <p:ph idx="1" type="body"/>
@@ -824,7 +824,7 @@
   <p:cSld>
     <p:spTree>
       <p:nvGrpSpPr>
-        <p:cNvPr id="184" name="Shape 184"/>
+        <p:cNvPr id="187" name="Shape 187"/>
         <p:cNvGrpSpPr/>
         <p:nvPr/>
       </p:nvGrpSpPr>
@@ -838,7 +838,7 @@
       </p:grpSpPr>
       <p:sp>
         <p:nvSpPr>
-          <p:cNvPr id="185" name="Google Shape;185;g10044562dcd_4_15:notes"/>
+          <p:cNvPr id="188" name="Google Shape;188;g10044562dcd_4_15:notes"/>
           <p:cNvSpPr/>
           <p:nvPr>
             <p:ph idx="2" type="sldImg"/>
@@ -873,7 +873,7 @@
       </p:sp>
       <p:sp>
         <p:nvSpPr>
-          <p:cNvPr id="186" name="Google Shape;186;g10044562dcd_4_15:notes"/>
+          <p:cNvPr id="189" name="Google Shape;189;g10044562dcd_4_15:notes"/>
           <p:cNvSpPr txBox="1"/>
           <p:nvPr>
             <p:ph idx="1" type="body"/>
@@ -923,7 +923,7 @@
   <p:cSld>
     <p:spTree>
       <p:nvGrpSpPr>
-        <p:cNvPr id="190" name="Shape 190"/>
+        <p:cNvPr id="193" name="Shape 193"/>
         <p:cNvGrpSpPr/>
         <p:nvPr/>
       </p:nvGrpSpPr>
@@ -937,7 +937,7 @@
       </p:grpSpPr>
       <p:sp>
         <p:nvSpPr>
-          <p:cNvPr id="191" name="Google Shape;191;g10044562dcd_4_26:notes"/>
+          <p:cNvPr id="194" name="Google Shape;194;g10044562dcd_4_26:notes"/>
           <p:cNvSpPr/>
           <p:nvPr>
             <p:ph idx="2" type="sldImg"/>
@@ -972,7 +972,7 @@
       </p:sp>
       <p:sp>
         <p:nvSpPr>
-          <p:cNvPr id="192" name="Google Shape;192;g10044562dcd_4_26:notes"/>
+          <p:cNvPr id="195" name="Google Shape;195;g10044562dcd_4_26:notes"/>
           <p:cNvSpPr txBox="1"/>
           <p:nvPr>
             <p:ph idx="1" type="body"/>
@@ -1022,7 +1022,7 @@
   <p:cSld>
     <p:spTree>
       <p:nvGrpSpPr>
-        <p:cNvPr id="196" name="Shape 196"/>
+        <p:cNvPr id="199" name="Shape 199"/>
         <p:cNvGrpSpPr/>
         <p:nvPr/>
       </p:nvGrpSpPr>
@@ -1036,7 +1036,7 @@
       </p:grpSpPr>
       <p:sp>
         <p:nvSpPr>
-          <p:cNvPr id="197" name="Google Shape;197;g10044562dcd_4_31:notes"/>
+          <p:cNvPr id="200" name="Google Shape;200;g10044562dcd_4_31:notes"/>
           <p:cNvSpPr/>
           <p:nvPr>
             <p:ph idx="2" type="sldImg"/>
@@ -1071,7 +1071,7 @@
       </p:sp>
       <p:sp>
         <p:nvSpPr>
-          <p:cNvPr id="198" name="Google Shape;198;g10044562dcd_4_31:notes"/>
+          <p:cNvPr id="201" name="Google Shape;201;g10044562dcd_4_31:notes"/>
           <p:cNvSpPr txBox="1"/>
           <p:nvPr>
             <p:ph idx="1" type="body"/>
@@ -1121,7 +1121,7 @@
   <p:cSld>
     <p:spTree>
       <p:nvGrpSpPr>
-        <p:cNvPr id="202" name="Shape 202"/>
+        <p:cNvPr id="205" name="Shape 205"/>
         <p:cNvGrpSpPr/>
         <p:nvPr/>
       </p:nvGrpSpPr>
@@ -1135,7 +1135,7 @@
       </p:grpSpPr>
       <p:sp>
         <p:nvSpPr>
-          <p:cNvPr id="203" name="Google Shape;203;g10044562dcd_4_36:notes"/>
+          <p:cNvPr id="206" name="Google Shape;206;g10044562dcd_4_36:notes"/>
           <p:cNvSpPr/>
           <p:nvPr>
             <p:ph idx="2" type="sldImg"/>
@@ -1170,7 +1170,7 @@
       </p:sp>
       <p:sp>
         <p:nvSpPr>
-          <p:cNvPr id="204" name="Google Shape;204;g10044562dcd_4_36:notes"/>
+          <p:cNvPr id="207" name="Google Shape;207;g10044562dcd_4_36:notes"/>
           <p:cNvSpPr txBox="1"/>
           <p:nvPr>
             <p:ph idx="1" type="body"/>
@@ -1220,7 +1220,7 @@
   <p:cSld>
     <p:spTree>
       <p:nvGrpSpPr>
-        <p:cNvPr id="208" name="Shape 208"/>
+        <p:cNvPr id="211" name="Shape 211"/>
         <p:cNvGrpSpPr/>
         <p:nvPr/>
       </p:nvGrpSpPr>
@@ -1234,7 +1234,7 @@
       </p:grpSpPr>
       <p:sp>
         <p:nvSpPr>
-          <p:cNvPr id="209" name="Google Shape;209;g10044562dcd_4_41:notes"/>
+          <p:cNvPr id="212" name="Google Shape;212;g10044562dcd_4_41:notes"/>
           <p:cNvSpPr/>
           <p:nvPr>
             <p:ph idx="2" type="sldImg"/>
@@ -1269,7 +1269,7 @@
       </p:sp>
       <p:sp>
         <p:nvSpPr>
-          <p:cNvPr id="210" name="Google Shape;210;g10044562dcd_4_41:notes"/>
+          <p:cNvPr id="213" name="Google Shape;213;g10044562dcd_4_41:notes"/>
           <p:cNvSpPr txBox="1"/>
           <p:nvPr>
             <p:ph idx="1" type="body"/>
@@ -1319,7 +1319,7 @@
   <p:cSld>
     <p:spTree>
       <p:nvGrpSpPr>
-        <p:cNvPr id="214" name="Shape 214"/>
+        <p:cNvPr id="217" name="Shape 217"/>
         <p:cNvGrpSpPr/>
         <p:nvPr/>
       </p:nvGrpSpPr>
@@ -1333,7 +1333,7 @@
       </p:grpSpPr>
       <p:sp>
         <p:nvSpPr>
-          <p:cNvPr id="215" name="Google Shape;215;g10044562dcd_4_46:notes"/>
+          <p:cNvPr id="218" name="Google Shape;218;g10044562dcd_4_46:notes"/>
           <p:cNvSpPr/>
           <p:nvPr>
             <p:ph idx="2" type="sldImg"/>
@@ -1368,7 +1368,7 @@
       </p:sp>
       <p:sp>
         <p:nvSpPr>
-          <p:cNvPr id="216" name="Google Shape;216;g10044562dcd_4_46:notes"/>
+          <p:cNvPr id="219" name="Google Shape;219;g10044562dcd_4_46:notes"/>
           <p:cNvSpPr txBox="1"/>
           <p:nvPr>
             <p:ph idx="1" type="body"/>
@@ -1418,7 +1418,7 @@
   <p:cSld>
     <p:spTree>
       <p:nvGrpSpPr>
-        <p:cNvPr id="220" name="Shape 220"/>
+        <p:cNvPr id="223" name="Shape 223"/>
         <p:cNvGrpSpPr/>
         <p:nvPr/>
       </p:nvGrpSpPr>
@@ -1432,7 +1432,7 @@
       </p:grpSpPr>
       <p:sp>
         <p:nvSpPr>
-          <p:cNvPr id="221" name="Google Shape;221;g10044562dcd_4_51:notes"/>
+          <p:cNvPr id="224" name="Google Shape;224;g10044562dcd_4_51:notes"/>
           <p:cNvSpPr/>
           <p:nvPr>
             <p:ph idx="2" type="sldImg"/>
@@ -1467,7 +1467,7 @@
       </p:sp>
       <p:sp>
         <p:nvSpPr>
-          <p:cNvPr id="222" name="Google Shape;222;g10044562dcd_4_51:notes"/>
+          <p:cNvPr id="225" name="Google Shape;225;g10044562dcd_4_51:notes"/>
           <p:cNvSpPr txBox="1"/>
           <p:nvPr>
             <p:ph idx="1" type="body"/>
@@ -1517,7 +1517,7 @@
   <p:cSld>
     <p:spTree>
       <p:nvGrpSpPr>
-        <p:cNvPr id="125" name="Shape 125"/>
+        <p:cNvPr id="128" name="Shape 128"/>
         <p:cNvGrpSpPr/>
         <p:nvPr/>
       </p:nvGrpSpPr>
@@ -1531,7 +1531,7 @@
       </p:grpSpPr>
       <p:sp>
         <p:nvSpPr>
-          <p:cNvPr id="126" name="Google Shape;126;g10044562dcd_4_95:notes"/>
+          <p:cNvPr id="129" name="Google Shape;129;g10044562dcd_4_95:notes"/>
           <p:cNvSpPr/>
           <p:nvPr>
             <p:ph idx="2" type="sldImg"/>
@@ -1566,7 +1566,7 @@
       </p:sp>
       <p:sp>
         <p:nvSpPr>
-          <p:cNvPr id="127" name="Google Shape;127;g10044562dcd_4_95:notes"/>
+          <p:cNvPr id="130" name="Google Shape;130;g10044562dcd_4_95:notes"/>
           <p:cNvSpPr txBox="1"/>
           <p:nvPr>
             <p:ph idx="1" type="body"/>
@@ -1616,7 +1616,7 @@
   <p:cSld>
     <p:spTree>
       <p:nvGrpSpPr>
-        <p:cNvPr id="131" name="Shape 131"/>
+        <p:cNvPr id="134" name="Shape 134"/>
         <p:cNvGrpSpPr/>
         <p:nvPr/>
       </p:nvGrpSpPr>
@@ -1630,7 +1630,7 @@
       </p:grpSpPr>
       <p:sp>
         <p:nvSpPr>
-          <p:cNvPr id="132" name="Google Shape;132;g10044562dcd_5_21:notes"/>
+          <p:cNvPr id="135" name="Google Shape;135;g10044562dcd_5_21:notes"/>
           <p:cNvSpPr/>
           <p:nvPr>
             <p:ph idx="2" type="sldImg"/>
@@ -1665,7 +1665,7 @@
       </p:sp>
       <p:sp>
         <p:nvSpPr>
-          <p:cNvPr id="133" name="Google Shape;133;g10044562dcd_5_21:notes"/>
+          <p:cNvPr id="136" name="Google Shape;136;g10044562dcd_5_21:notes"/>
           <p:cNvSpPr txBox="1"/>
           <p:nvPr>
             <p:ph idx="1" type="body"/>
@@ -1715,7 +1715,7 @@
   <p:cSld>
     <p:spTree>
       <p:nvGrpSpPr>
-        <p:cNvPr id="135" name="Shape 135"/>
+        <p:cNvPr id="138" name="Shape 138"/>
         <p:cNvGrpSpPr/>
         <p:nvPr/>
       </p:nvGrpSpPr>
@@ -1729,7 +1729,7 @@
       </p:grpSpPr>
       <p:sp>
         <p:nvSpPr>
-          <p:cNvPr id="136" name="Google Shape;136;g10044562dcd_4_56:notes"/>
+          <p:cNvPr id="139" name="Google Shape;139;g10044562dcd_4_56:notes"/>
           <p:cNvSpPr/>
           <p:nvPr>
             <p:ph idx="2" type="sldImg"/>
@@ -1764,7 +1764,7 @@
       </p:sp>
       <p:sp>
         <p:nvSpPr>
-          <p:cNvPr id="137" name="Google Shape;137;g10044562dcd_4_56:notes"/>
+          <p:cNvPr id="140" name="Google Shape;140;g10044562dcd_4_56:notes"/>
           <p:cNvSpPr txBox="1"/>
           <p:nvPr>
             <p:ph idx="1" type="body"/>
@@ -1814,7 +1814,7 @@
   <p:cSld>
     <p:spTree>
       <p:nvGrpSpPr>
-        <p:cNvPr id="148" name="Shape 148"/>
+        <p:cNvPr id="151" name="Shape 151"/>
         <p:cNvGrpSpPr/>
         <p:nvPr/>
       </p:nvGrpSpPr>
@@ -1828,7 +1828,7 @@
       </p:grpSpPr>
       <p:sp>
         <p:nvSpPr>
-          <p:cNvPr id="149" name="Google Shape;149;g10044562dcd_4_73:notes"/>
+          <p:cNvPr id="152" name="Google Shape;152;g10044562dcd_4_73:notes"/>
           <p:cNvSpPr/>
           <p:nvPr>
             <p:ph idx="2" type="sldImg"/>
@@ -1863,7 +1863,7 @@
       </p:sp>
       <p:sp>
         <p:nvSpPr>
-          <p:cNvPr id="150" name="Google Shape;150;g10044562dcd_4_73:notes"/>
+          <p:cNvPr id="153" name="Google Shape;153;g10044562dcd_4_73:notes"/>
           <p:cNvSpPr txBox="1"/>
           <p:nvPr>
             <p:ph idx="1" type="body"/>
@@ -1913,7 +1913,7 @@
   <p:cSld>
     <p:spTree>
       <p:nvGrpSpPr>
-        <p:cNvPr id="161" name="Shape 161"/>
+        <p:cNvPr id="164" name="Shape 164"/>
         <p:cNvGrpSpPr/>
         <p:nvPr/>
       </p:nvGrpSpPr>
@@ -1927,7 +1927,7 @@
       </p:grpSpPr>
       <p:sp>
         <p:nvSpPr>
-          <p:cNvPr id="162" name="Google Shape;162;g10044562dcd_4_116:notes"/>
+          <p:cNvPr id="165" name="Google Shape;165;g10044562dcd_4_116:notes"/>
           <p:cNvSpPr/>
           <p:nvPr>
             <p:ph idx="2" type="sldImg"/>
@@ -1962,7 +1962,7 @@
       </p:sp>
       <p:sp>
         <p:nvSpPr>
-          <p:cNvPr id="163" name="Google Shape;163;g10044562dcd_4_116:notes"/>
+          <p:cNvPr id="166" name="Google Shape;166;g10044562dcd_4_116:notes"/>
           <p:cNvSpPr txBox="1"/>
           <p:nvPr>
             <p:ph idx="1" type="body"/>
@@ -2012,7 +2012,7 @@
   <p:cSld>
     <p:spTree>
       <p:nvGrpSpPr>
-        <p:cNvPr id="166" name="Shape 166"/>
+        <p:cNvPr id="169" name="Shape 169"/>
         <p:cNvGrpSpPr/>
         <p:nvPr/>
       </p:nvGrpSpPr>
@@ -2026,7 +2026,7 @@
       </p:grpSpPr>
       <p:sp>
         <p:nvSpPr>
-          <p:cNvPr id="167" name="Google Shape;167;g10044562dcd_4_0:notes"/>
+          <p:cNvPr id="170" name="Google Shape;170;g10044562dcd_4_0:notes"/>
           <p:cNvSpPr/>
           <p:nvPr>
             <p:ph idx="2" type="sldImg"/>
@@ -2061,7 +2061,7 @@
       </p:sp>
       <p:sp>
         <p:nvSpPr>
-          <p:cNvPr id="168" name="Google Shape;168;g10044562dcd_4_0:notes"/>
+          <p:cNvPr id="171" name="Google Shape;171;g10044562dcd_4_0:notes"/>
           <p:cNvSpPr txBox="1"/>
           <p:nvPr>
             <p:ph idx="1" type="body"/>
@@ -2111,7 +2111,7 @@
   <p:cSld>
     <p:spTree>
       <p:nvGrpSpPr>
-        <p:cNvPr id="172" name="Shape 172"/>
+        <p:cNvPr id="175" name="Shape 175"/>
         <p:cNvGrpSpPr/>
         <p:nvPr/>
       </p:nvGrpSpPr>
@@ -2125,7 +2125,7 @@
       </p:grpSpPr>
       <p:sp>
         <p:nvSpPr>
-          <p:cNvPr id="173" name="Google Shape;173;g10044562dcd_4_5:notes"/>
+          <p:cNvPr id="176" name="Google Shape;176;g10044562dcd_4_5:notes"/>
           <p:cNvSpPr/>
           <p:nvPr>
             <p:ph idx="2" type="sldImg"/>
@@ -2160,7 +2160,7 @@
       </p:sp>
       <p:sp>
         <p:nvSpPr>
-          <p:cNvPr id="174" name="Google Shape;174;g10044562dcd_4_5:notes"/>
+          <p:cNvPr id="177" name="Google Shape;177;g10044562dcd_4_5:notes"/>
           <p:cNvSpPr txBox="1"/>
           <p:nvPr>
             <p:ph idx="1" type="body"/>
@@ -2210,7 +2210,7 @@
   <p:cSld>
     <p:spTree>
       <p:nvGrpSpPr>
-        <p:cNvPr id="178" name="Shape 178"/>
+        <p:cNvPr id="181" name="Shape 181"/>
         <p:cNvGrpSpPr/>
         <p:nvPr/>
       </p:nvGrpSpPr>
@@ -2224,7 +2224,7 @@
       </p:grpSpPr>
       <p:sp>
         <p:nvSpPr>
-          <p:cNvPr id="179" name="Google Shape;179;g10044562dcd_4_10:notes"/>
+          <p:cNvPr id="182" name="Google Shape;182;g10044562dcd_4_10:notes"/>
           <p:cNvSpPr/>
           <p:nvPr>
             <p:ph idx="2" type="sldImg"/>
@@ -2259,7 +2259,7 @@
       </p:sp>
       <p:sp>
         <p:nvSpPr>
-          <p:cNvPr id="180" name="Google Shape;180;g10044562dcd_4_10:notes"/>
+          <p:cNvPr id="183" name="Google Shape;183;g10044562dcd_4_10:notes"/>
           <p:cNvSpPr txBox="1"/>
           <p:nvPr>
             <p:ph idx="1" type="body"/>
@@ -5752,17 +5752,21 @@
         </p:nvSpPr>
         <p:spPr>
           <a:xfrm>
-            <a:off x="345425" y="5242632"/>
-            <a:ext cx="8448000" cy="809100"/>
+            <a:off x="348100" y="349175"/>
+            <a:ext cx="8448000" cy="6258000"/>
           </a:xfrm>
           <a:prstGeom prst="rect">
             <a:avLst/>
           </a:prstGeom>
-          <a:solidFill>
-            <a:schemeClr val="dk1"/>
-          </a:solidFill>
-          <a:ln>
-            <a:noFill/>
+          <a:noFill/>
+          <a:ln cap="flat" cmpd="sng" w="28575">
+            <a:solidFill>
+              <a:schemeClr val="dk1"/>
+            </a:solidFill>
+            <a:prstDash val="solid"/>
+            <a:round/>
+            <a:headEnd len="sm" w="sm" type="none"/>
+            <a:tailEnd len="sm" w="sm" type="none"/>
           </a:ln>
         </p:spPr>
         <p:txBody>
@@ -5795,14 +5799,16 @@
         </p:nvSpPr>
         <p:spPr>
           <a:xfrm>
-            <a:off x="348100" y="349175"/>
-            <a:ext cx="8448000" cy="6258000"/>
-          </a:xfrm>
-          <a:prstGeom prst="rect">
-            <a:avLst/>
+            <a:off x="507525" y="1353000"/>
+            <a:ext cx="2593800" cy="2516400"/>
+          </a:xfrm>
+          <a:prstGeom prst="roundRect">
+            <a:avLst>
+              <a:gd fmla="val 4604" name="adj"/>
+            </a:avLst>
           </a:prstGeom>
           <a:noFill/>
-          <a:ln cap="flat" cmpd="sng" w="28575">
+          <a:ln cap="flat" cmpd="sng" w="114300">
             <a:solidFill>
               <a:schemeClr val="dk1"/>
             </a:solidFill>
@@ -5818,7 +5824,7 @@
           </a:bodyPr>
           <a:lstStyle/>
           <a:p>
-            <a:pPr indent="0" lvl="0" marL="0" rtl="0" algn="l">
+            <a:pPr indent="0" lvl="0" marL="0" rtl="0" algn="ctr">
               <a:spcBef>
                 <a:spcPts val="0"/>
               </a:spcBef>
@@ -5830,7 +5836,12 @@
             <a:r>
               <a:t/>
             </a:r>
-            <a:endParaRPr/>
+            <a:endParaRPr>
+              <a:latin typeface="Roboto Light"/>
+              <a:ea typeface="Roboto Light"/>
+              <a:cs typeface="Roboto Light"/>
+              <a:sym typeface="Roboto Light"/>
+            </a:endParaRPr>
           </a:p>
         </p:txBody>
       </p:sp>
@@ -5850,8 +5861,8 @@
         </p:blipFill>
         <p:spPr>
           <a:xfrm>
-            <a:off x="7846300" y="5354883"/>
-            <a:ext cx="568800" cy="568800"/>
+            <a:off x="507475" y="1314200"/>
+            <a:ext cx="2593850" cy="2593850"/>
           </a:xfrm>
           <a:prstGeom prst="rect">
             <a:avLst/>
@@ -5862,14 +5873,57 @@
           </a:ln>
         </p:spPr>
       </p:pic>
+      <p:sp>
+        <p:nvSpPr>
+          <p:cNvPr id="95" name="Google Shape;95;p15"/>
+          <p:cNvSpPr/>
+          <p:nvPr/>
+        </p:nvSpPr>
+        <p:spPr>
+          <a:xfrm>
+            <a:off x="345425" y="5242632"/>
+            <a:ext cx="8448000" cy="809100"/>
+          </a:xfrm>
+          <a:prstGeom prst="rect">
+            <a:avLst/>
+          </a:prstGeom>
+          <a:solidFill>
+            <a:schemeClr val="dk1"/>
+          </a:solidFill>
+          <a:ln>
+            <a:noFill/>
+          </a:ln>
+        </p:spPr>
+        <p:txBody>
+          <a:bodyPr anchorCtr="0" anchor="ctr" bIns="91425" lIns="91425" spcFirstLastPara="1" rIns="91425" wrap="square" tIns="91425">
+            <a:noAutofit/>
+          </a:bodyPr>
+          <a:lstStyle/>
+          <a:p>
+            <a:pPr indent="0" lvl="0" marL="0" rtl="0" algn="l">
+              <a:spcBef>
+                <a:spcPts val="0"/>
+              </a:spcBef>
+              <a:spcAft>
+                <a:spcPts val="0"/>
+              </a:spcAft>
+              <a:buNone/>
+            </a:pPr>
+            <a:r>
+              <a:t/>
+            </a:r>
+            <a:endParaRPr/>
+          </a:p>
+        </p:txBody>
+      </p:sp>
       <p:pic>
         <p:nvPicPr>
-          <p:cNvPr id="95" name="Google Shape;95;p15"/>
+          <p:cNvPr id="96" name="Google Shape;96;p15"/>
           <p:cNvPicPr preferRelativeResize="0"/>
           <p:nvPr/>
         </p:nvPicPr>
         <p:blipFill>
-          <a:blip r:embed="rId2">
+          <a:blip r:embed="rId3">
             <a:alphaModFix/>
           </a:blip>
           <a:stretch>
@@ -5878,7 +5932,7 @@
         </p:blipFill>
         <p:spPr>
           <a:xfrm>
-            <a:off x="729100" y="5362783"/>
+            <a:off x="7846300" y="5354883"/>
             <a:ext cx="568800" cy="568800"/>
           </a:xfrm>
           <a:prstGeom prst="rect">
@@ -5892,21 +5946,22 @@
       </p:pic>
       <p:pic>
         <p:nvPicPr>
-          <p:cNvPr id="96" name="Google Shape;96;p15"/>
+          <p:cNvPr id="97" name="Google Shape;97;p15"/>
           <p:cNvPicPr preferRelativeResize="0"/>
           <p:nvPr/>
         </p:nvPicPr>
-        <p:blipFill rotWithShape="1">
+        <p:blipFill>
           <a:blip r:embed="rId3">
             <a:alphaModFix/>
           </a:blip>
-          <a:srcRect b="14639" l="0" r="0" t="0"/>
-          <a:stretch/>
+          <a:stretch>
+            <a:fillRect/>
+          </a:stretch>
         </p:blipFill>
         <p:spPr>
           <a:xfrm>
-            <a:off x="465075" y="1293075"/>
-            <a:ext cx="2636250" cy="2711851"/>
+            <a:off x="729100" y="5362783"/>
+            <a:ext cx="568800" cy="568800"/>
           </a:xfrm>
           <a:prstGeom prst="rect">
             <a:avLst/>
@@ -5919,246 +5974,7 @@
       </p:pic>
       <p:sp>
         <p:nvSpPr>
-          <p:cNvPr id="97" name="Google Shape;97;p15"/>
-          <p:cNvSpPr txBox="1"/>
-          <p:nvPr/>
-        </p:nvSpPr>
-        <p:spPr>
-          <a:xfrm>
-            <a:off x="465225" y="3929325"/>
-            <a:ext cx="2636100" cy="568800"/>
-          </a:xfrm>
-          <a:prstGeom prst="rect">
-            <a:avLst/>
-          </a:prstGeom>
-          <a:noFill/>
-          <a:ln>
-            <a:noFill/>
-          </a:ln>
-        </p:spPr>
-        <p:txBody>
-          <a:bodyPr anchorCtr="0" anchor="t" bIns="91425" lIns="91425" spcFirstLastPara="1" rIns="91425" wrap="square" tIns="91425">
-            <a:noAutofit/>
-          </a:bodyPr>
-          <a:lstStyle/>
-          <a:p>
-            <a:pPr indent="0" lvl="0" marL="0" rtl="0" algn="ctr">
-              <a:lnSpc>
-                <a:spcPct val="115000"/>
-              </a:lnSpc>
-              <a:spcBef>
-                <a:spcPts val="0"/>
-              </a:spcBef>
-              <a:spcAft>
-                <a:spcPts val="1600"/>
-              </a:spcAft>
-              <a:buNone/>
-            </a:pPr>
-            <a:r>
-              <a:rPr lang="pt-BR" sz="2100">
-                <a:solidFill>
-                  <a:srgbClr val="2A2A2A"/>
-                </a:solidFill>
-                <a:latin typeface="Big Shoulders Text"/>
-                <a:ea typeface="Big Shoulders Text"/>
-                <a:cs typeface="Big Shoulders Text"/>
-                <a:sym typeface="Big Shoulders Text"/>
-              </a:rPr>
-              <a:t>picpay.me/dunossauro</a:t>
-            </a:r>
-            <a:endParaRPr sz="2100">
-              <a:solidFill>
-                <a:srgbClr val="2A2A2A"/>
-              </a:solidFill>
-              <a:latin typeface="Big Shoulders Text"/>
-              <a:ea typeface="Big Shoulders Text"/>
-              <a:cs typeface="Big Shoulders Text"/>
-              <a:sym typeface="Big Shoulders Text"/>
-            </a:endParaRPr>
-          </a:p>
-        </p:txBody>
-      </p:sp>
-      <p:pic>
-        <p:nvPicPr>
           <p:cNvPr id="98" name="Google Shape;98;p15"/>
-          <p:cNvPicPr preferRelativeResize="0"/>
-          <p:nvPr/>
-        </p:nvPicPr>
-        <p:blipFill>
-          <a:blip r:embed="rId4">
-            <a:alphaModFix/>
-          </a:blip>
-          <a:stretch>
-            <a:fillRect/>
-          </a:stretch>
-        </p:blipFill>
-        <p:spPr>
-          <a:xfrm>
-            <a:off x="3253800" y="1293075"/>
-            <a:ext cx="2636250" cy="2636250"/>
-          </a:xfrm>
-          <a:prstGeom prst="rect">
-            <a:avLst/>
-          </a:prstGeom>
-          <a:noFill/>
-          <a:ln>
-            <a:noFill/>
-          </a:ln>
-        </p:spPr>
-      </p:pic>
-      <p:sp>
-        <p:nvSpPr>
-          <p:cNvPr id="99" name="Google Shape;99;p15"/>
-          <p:cNvSpPr txBox="1"/>
-          <p:nvPr/>
-        </p:nvSpPr>
-        <p:spPr>
-          <a:xfrm>
-            <a:off x="3253725" y="3929325"/>
-            <a:ext cx="2636400" cy="568800"/>
-          </a:xfrm>
-          <a:prstGeom prst="rect">
-            <a:avLst/>
-          </a:prstGeom>
-          <a:noFill/>
-          <a:ln>
-            <a:noFill/>
-          </a:ln>
-        </p:spPr>
-        <p:txBody>
-          <a:bodyPr anchorCtr="0" anchor="t" bIns="91425" lIns="91425" spcFirstLastPara="1" rIns="91425" wrap="square" tIns="91425">
-            <a:noAutofit/>
-          </a:bodyPr>
-          <a:lstStyle/>
-          <a:p>
-            <a:pPr indent="0" lvl="0" marL="0" rtl="0" algn="ctr">
-              <a:lnSpc>
-                <a:spcPct val="115000"/>
-              </a:lnSpc>
-              <a:spcBef>
-                <a:spcPts val="0"/>
-              </a:spcBef>
-              <a:spcAft>
-                <a:spcPts val="1600"/>
-              </a:spcAft>
-              <a:buNone/>
-            </a:pPr>
-            <a:r>
-              <a:rPr lang="pt-BR" sz="2100">
-                <a:solidFill>
-                  <a:srgbClr val="2A2A2A"/>
-                </a:solidFill>
-                <a:latin typeface="Big Shoulders Text"/>
-                <a:ea typeface="Big Shoulders Text"/>
-                <a:cs typeface="Big Shoulders Text"/>
-                <a:sym typeface="Big Shoulders Text"/>
-              </a:rPr>
-              <a:t>apoia.se/livedepython</a:t>
-            </a:r>
-            <a:endParaRPr sz="2100">
-              <a:solidFill>
-                <a:srgbClr val="2A2A2A"/>
-              </a:solidFill>
-              <a:latin typeface="Big Shoulders Text"/>
-              <a:ea typeface="Big Shoulders Text"/>
-              <a:cs typeface="Big Shoulders Text"/>
-              <a:sym typeface="Big Shoulders Text"/>
-            </a:endParaRPr>
-          </a:p>
-        </p:txBody>
-      </p:sp>
-      <p:pic>
-        <p:nvPicPr>
-          <p:cNvPr id="100" name="Google Shape;100;p15"/>
-          <p:cNvPicPr preferRelativeResize="0"/>
-          <p:nvPr/>
-        </p:nvPicPr>
-        <p:blipFill>
-          <a:blip r:embed="rId5">
-            <a:alphaModFix/>
-          </a:blip>
-          <a:stretch>
-            <a:fillRect/>
-          </a:stretch>
-        </p:blipFill>
-        <p:spPr>
-          <a:xfrm>
-            <a:off x="6042525" y="1293075"/>
-            <a:ext cx="2636101" cy="2636101"/>
-          </a:xfrm>
-          <a:prstGeom prst="rect">
-            <a:avLst/>
-          </a:prstGeom>
-          <a:noFill/>
-          <a:ln>
-            <a:noFill/>
-          </a:ln>
-        </p:spPr>
-      </p:pic>
-      <p:sp>
-        <p:nvSpPr>
-          <p:cNvPr id="101" name="Google Shape;101;p15"/>
-          <p:cNvSpPr txBox="1"/>
-          <p:nvPr/>
-        </p:nvSpPr>
-        <p:spPr>
-          <a:xfrm>
-            <a:off x="6042525" y="3929325"/>
-            <a:ext cx="2636400" cy="568800"/>
-          </a:xfrm>
-          <a:prstGeom prst="rect">
-            <a:avLst/>
-          </a:prstGeom>
-          <a:noFill/>
-          <a:ln>
-            <a:noFill/>
-          </a:ln>
-        </p:spPr>
-        <p:txBody>
-          <a:bodyPr anchorCtr="0" anchor="t" bIns="91425" lIns="91425" spcFirstLastPara="1" rIns="91425" wrap="square" tIns="91425">
-            <a:noAutofit/>
-          </a:bodyPr>
-          <a:lstStyle/>
-          <a:p>
-            <a:pPr indent="0" lvl="0" marL="0" rtl="0" algn="ctr">
-              <a:lnSpc>
-                <a:spcPct val="115000"/>
-              </a:lnSpc>
-              <a:spcBef>
-                <a:spcPts val="0"/>
-              </a:spcBef>
-              <a:spcAft>
-                <a:spcPts val="1600"/>
-              </a:spcAft>
-              <a:buNone/>
-            </a:pPr>
-            <a:r>
-              <a:rPr lang="pt-BR" sz="2100">
-                <a:solidFill>
-                  <a:srgbClr val="2A2A2A"/>
-                </a:solidFill>
-                <a:latin typeface="Big Shoulders Text"/>
-                <a:ea typeface="Big Shoulders Text"/>
-                <a:cs typeface="Big Shoulders Text"/>
-                <a:sym typeface="Big Shoulders Text"/>
-              </a:rPr>
-              <a:t>PIX</a:t>
-            </a:r>
-            <a:endParaRPr sz="2100">
-              <a:solidFill>
-                <a:srgbClr val="2A2A2A"/>
-              </a:solidFill>
-              <a:latin typeface="Big Shoulders Text"/>
-              <a:ea typeface="Big Shoulders Text"/>
-              <a:cs typeface="Big Shoulders Text"/>
-              <a:sym typeface="Big Shoulders Text"/>
-            </a:endParaRPr>
-          </a:p>
-        </p:txBody>
-      </p:sp>
-      <p:sp>
-        <p:nvSpPr>
-          <p:cNvPr id="102" name="Google Shape;102;p15"/>
           <p:cNvSpPr txBox="1"/>
           <p:nvPr/>
         </p:nvSpPr>
@@ -6214,11 +6030,379 @@
           </a:p>
         </p:txBody>
       </p:sp>
+      <p:sp>
+        <p:nvSpPr>
+          <p:cNvPr id="99" name="Google Shape;99;p15"/>
+          <p:cNvSpPr txBox="1"/>
+          <p:nvPr/>
+        </p:nvSpPr>
+        <p:spPr>
+          <a:xfrm>
+            <a:off x="465225" y="3929325"/>
+            <a:ext cx="2636100" cy="568800"/>
+          </a:xfrm>
+          <a:prstGeom prst="rect">
+            <a:avLst/>
+          </a:prstGeom>
+          <a:noFill/>
+          <a:ln>
+            <a:noFill/>
+          </a:ln>
+        </p:spPr>
+        <p:txBody>
+          <a:bodyPr anchorCtr="0" anchor="t" bIns="91425" lIns="91425" spcFirstLastPara="1" rIns="91425" wrap="square" tIns="91425">
+            <a:noAutofit/>
+          </a:bodyPr>
+          <a:lstStyle/>
+          <a:p>
+            <a:pPr indent="0" lvl="0" marL="0" rtl="0" algn="ctr">
+              <a:lnSpc>
+                <a:spcPct val="115000"/>
+              </a:lnSpc>
+              <a:spcBef>
+                <a:spcPts val="0"/>
+              </a:spcBef>
+              <a:spcAft>
+                <a:spcPts val="1600"/>
+              </a:spcAft>
+              <a:buNone/>
+            </a:pPr>
+            <a:r>
+              <a:rPr lang="pt-BR" sz="2100">
+                <a:solidFill>
+                  <a:schemeClr val="dk1"/>
+                </a:solidFill>
+                <a:latin typeface="Big Shoulders Text"/>
+                <a:ea typeface="Big Shoulders Text"/>
+                <a:cs typeface="Big Shoulders Text"/>
+                <a:sym typeface="Big Shoulders Text"/>
+              </a:rPr>
+              <a:t>apoia.se/livedepython</a:t>
+            </a:r>
+            <a:endParaRPr sz="2100">
+              <a:solidFill>
+                <a:srgbClr val="2A2A2A"/>
+              </a:solidFill>
+              <a:latin typeface="Big Shoulders Text"/>
+              <a:ea typeface="Big Shoulders Text"/>
+              <a:cs typeface="Big Shoulders Text"/>
+              <a:sym typeface="Big Shoulders Text"/>
+            </a:endParaRPr>
+          </a:p>
+        </p:txBody>
+      </p:sp>
+      <p:sp>
+        <p:nvSpPr>
+          <p:cNvPr id="100" name="Google Shape;100;p15"/>
+          <p:cNvSpPr/>
+          <p:nvPr/>
+        </p:nvSpPr>
+        <p:spPr>
+          <a:xfrm>
+            <a:off x="3296350" y="1353000"/>
+            <a:ext cx="2593800" cy="2516400"/>
+          </a:xfrm>
+          <a:prstGeom prst="roundRect">
+            <a:avLst>
+              <a:gd fmla="val 4604" name="adj"/>
+            </a:avLst>
+          </a:prstGeom>
+          <a:noFill/>
+          <a:ln cap="flat" cmpd="sng" w="114300">
+            <a:solidFill>
+              <a:schemeClr val="dk1"/>
+            </a:solidFill>
+            <a:prstDash val="solid"/>
+            <a:round/>
+            <a:headEnd len="sm" w="sm" type="none"/>
+            <a:tailEnd len="sm" w="sm" type="none"/>
+          </a:ln>
+        </p:spPr>
+        <p:txBody>
+          <a:bodyPr anchorCtr="0" anchor="ctr" bIns="91425" lIns="91425" spcFirstLastPara="1" rIns="91425" wrap="square" tIns="91425">
+            <a:noAutofit/>
+          </a:bodyPr>
+          <a:lstStyle/>
+          <a:p>
+            <a:pPr indent="0" lvl="0" marL="0" rtl="0" algn="ctr">
+              <a:spcBef>
+                <a:spcPts val="0"/>
+              </a:spcBef>
+              <a:spcAft>
+                <a:spcPts val="0"/>
+              </a:spcAft>
+              <a:buNone/>
+            </a:pPr>
+            <a:r>
+              <a:t/>
+            </a:r>
+            <a:endParaRPr>
+              <a:latin typeface="Roboto Light"/>
+              <a:ea typeface="Roboto Light"/>
+              <a:cs typeface="Roboto Light"/>
+              <a:sym typeface="Roboto Light"/>
+            </a:endParaRPr>
+          </a:p>
+        </p:txBody>
+      </p:sp>
+      <p:sp>
+        <p:nvSpPr>
+          <p:cNvPr id="101" name="Google Shape;101;p15"/>
+          <p:cNvSpPr txBox="1"/>
+          <p:nvPr/>
+        </p:nvSpPr>
+        <p:spPr>
+          <a:xfrm>
+            <a:off x="3254050" y="3929325"/>
+            <a:ext cx="2636100" cy="568800"/>
+          </a:xfrm>
+          <a:prstGeom prst="rect">
+            <a:avLst/>
+          </a:prstGeom>
+          <a:noFill/>
+          <a:ln>
+            <a:noFill/>
+          </a:ln>
+        </p:spPr>
+        <p:txBody>
+          <a:bodyPr anchorCtr="0" anchor="t" bIns="91425" lIns="91425" spcFirstLastPara="1" rIns="91425" wrap="square" tIns="91425">
+            <a:noAutofit/>
+          </a:bodyPr>
+          <a:lstStyle/>
+          <a:p>
+            <a:pPr indent="0" lvl="0" marL="0" rtl="0" algn="ctr">
+              <a:lnSpc>
+                <a:spcPct val="115000"/>
+              </a:lnSpc>
+              <a:spcBef>
+                <a:spcPts val="0"/>
+              </a:spcBef>
+              <a:spcAft>
+                <a:spcPts val="1600"/>
+              </a:spcAft>
+              <a:buNone/>
+            </a:pPr>
+            <a:r>
+              <a:rPr lang="pt-BR" sz="2100">
+                <a:solidFill>
+                  <a:schemeClr val="dk1"/>
+                </a:solidFill>
+                <a:latin typeface="Big Shoulders Text"/>
+                <a:ea typeface="Big Shoulders Text"/>
+                <a:cs typeface="Big Shoulders Text"/>
+                <a:sym typeface="Big Shoulders Text"/>
+              </a:rPr>
+              <a:t>pix.dunossauro@gmail.com</a:t>
+            </a:r>
+            <a:endParaRPr sz="2100">
+              <a:solidFill>
+                <a:srgbClr val="2A2A2A"/>
+              </a:solidFill>
+              <a:latin typeface="Big Shoulders Text"/>
+              <a:ea typeface="Big Shoulders Text"/>
+              <a:cs typeface="Big Shoulders Text"/>
+              <a:sym typeface="Big Shoulders Text"/>
+            </a:endParaRPr>
+          </a:p>
+        </p:txBody>
+      </p:sp>
+      <p:sp>
+        <p:nvSpPr>
+          <p:cNvPr id="102" name="Google Shape;102;p15"/>
+          <p:cNvSpPr/>
+          <p:nvPr/>
+        </p:nvSpPr>
+        <p:spPr>
+          <a:xfrm>
+            <a:off x="6085175" y="1353000"/>
+            <a:ext cx="2593800" cy="2516400"/>
+          </a:xfrm>
+          <a:prstGeom prst="roundRect">
+            <a:avLst>
+              <a:gd fmla="val 4604" name="adj"/>
+            </a:avLst>
+          </a:prstGeom>
+          <a:noFill/>
+          <a:ln cap="flat" cmpd="sng" w="114300">
+            <a:solidFill>
+              <a:schemeClr val="dk1"/>
+            </a:solidFill>
+            <a:prstDash val="solid"/>
+            <a:round/>
+            <a:headEnd len="sm" w="sm" type="none"/>
+            <a:tailEnd len="sm" w="sm" type="none"/>
+          </a:ln>
+        </p:spPr>
+        <p:txBody>
+          <a:bodyPr anchorCtr="0" anchor="ctr" bIns="91425" lIns="91425" spcFirstLastPara="1" rIns="91425" wrap="square" tIns="91425">
+            <a:noAutofit/>
+          </a:bodyPr>
+          <a:lstStyle/>
+          <a:p>
+            <a:pPr indent="0" lvl="0" marL="0" rtl="0" algn="ctr">
+              <a:spcBef>
+                <a:spcPts val="0"/>
+              </a:spcBef>
+              <a:spcAft>
+                <a:spcPts val="0"/>
+              </a:spcAft>
+              <a:buNone/>
+            </a:pPr>
+            <a:r>
+              <a:t/>
+            </a:r>
+            <a:endParaRPr>
+              <a:latin typeface="Roboto Light"/>
+              <a:ea typeface="Roboto Light"/>
+              <a:cs typeface="Roboto Light"/>
+              <a:sym typeface="Roboto Light"/>
+            </a:endParaRPr>
+          </a:p>
+        </p:txBody>
+      </p:sp>
+      <p:sp>
+        <p:nvSpPr>
+          <p:cNvPr id="103" name="Google Shape;103;p15"/>
+          <p:cNvSpPr txBox="1"/>
+          <p:nvPr/>
+        </p:nvSpPr>
+        <p:spPr>
+          <a:xfrm>
+            <a:off x="6042875" y="3929325"/>
+            <a:ext cx="2636100" cy="568800"/>
+          </a:xfrm>
+          <a:prstGeom prst="rect">
+            <a:avLst/>
+          </a:prstGeom>
+          <a:noFill/>
+          <a:ln>
+            <a:noFill/>
+          </a:ln>
+        </p:spPr>
+        <p:txBody>
+          <a:bodyPr anchorCtr="0" anchor="t" bIns="91425" lIns="91425" spcFirstLastPara="1" rIns="91425" wrap="square" tIns="91425">
+            <a:noAutofit/>
+          </a:bodyPr>
+          <a:lstStyle/>
+          <a:p>
+            <a:pPr indent="0" lvl="0" marL="0" rtl="0" algn="ctr">
+              <a:lnSpc>
+                <a:spcPct val="115000"/>
+              </a:lnSpc>
+              <a:spcBef>
+                <a:spcPts val="0"/>
+              </a:spcBef>
+              <a:spcAft>
+                <a:spcPts val="1600"/>
+              </a:spcAft>
+              <a:buNone/>
+            </a:pPr>
+            <a:r>
+              <a:rPr lang="pt-BR" sz="2100">
+                <a:solidFill>
+                  <a:schemeClr val="dk1"/>
+                </a:solidFill>
+                <a:latin typeface="Big Shoulders Text"/>
+                <a:ea typeface="Big Shoulders Text"/>
+                <a:cs typeface="Big Shoulders Text"/>
+                <a:sym typeface="Big Shoulders Text"/>
+              </a:rPr>
+              <a:t>patreon.com/dunossauro</a:t>
+            </a:r>
+            <a:endParaRPr sz="2100">
+              <a:solidFill>
+                <a:srgbClr val="2A2A2A"/>
+              </a:solidFill>
+              <a:latin typeface="Big Shoulders Text"/>
+              <a:ea typeface="Big Shoulders Text"/>
+              <a:cs typeface="Big Shoulders Text"/>
+              <a:sym typeface="Big Shoulders Text"/>
+            </a:endParaRPr>
+          </a:p>
+        </p:txBody>
+      </p:sp>
+      <p:pic>
+        <p:nvPicPr>
+          <p:cNvPr id="104" name="Google Shape;104;p15"/>
+          <p:cNvPicPr preferRelativeResize="0"/>
+          <p:nvPr/>
+        </p:nvPicPr>
+        <p:blipFill>
+          <a:blip r:embed="rId4">
+            <a:alphaModFix/>
+          </a:blip>
+          <a:stretch>
+            <a:fillRect/>
+          </a:stretch>
+        </p:blipFill>
+        <p:spPr>
+          <a:xfrm>
+            <a:off x="3251375" y="1293136"/>
+            <a:ext cx="2636100" cy="2636127"/>
+          </a:xfrm>
+          <a:prstGeom prst="rect">
+            <a:avLst/>
+          </a:prstGeom>
+          <a:noFill/>
+          <a:ln>
+            <a:noFill/>
+          </a:ln>
+        </p:spPr>
+      </p:pic>
+      <p:pic>
+        <p:nvPicPr>
+          <p:cNvPr id="105" name="Google Shape;105;p15"/>
+          <p:cNvPicPr preferRelativeResize="0"/>
+          <p:nvPr/>
+        </p:nvPicPr>
+        <p:blipFill>
+          <a:blip r:embed="rId5">
+            <a:alphaModFix/>
+          </a:blip>
+          <a:stretch>
+            <a:fillRect/>
+          </a:stretch>
+        </p:blipFill>
+        <p:spPr>
+          <a:xfrm>
+            <a:off x="6064025" y="1293150"/>
+            <a:ext cx="2636100" cy="2636100"/>
+          </a:xfrm>
+          <a:prstGeom prst="rect">
+            <a:avLst/>
+          </a:prstGeom>
+          <a:noFill/>
+          <a:ln>
+            <a:noFill/>
+          </a:ln>
+        </p:spPr>
+      </p:pic>
     </p:spTree>
   </p:cSld>
   <p:clrMapOvr>
     <a:masterClrMapping/>
   </p:clrMapOvr>
+  <p:extLst>
+    <p:ext uri="{DCECCB84-F9BA-43D5-87BE-67443E8EF086}">
+      <p15:sldGuideLst>
+        <p15:guide id="1" orient="horz" pos="852">
+          <p15:clr>
+            <a:srgbClr val="E46962"/>
+          </p15:clr>
+        </p15:guide>
+        <p15:guide id="2" pos="2009">
+          <p15:clr>
+            <a:srgbClr val="E46962"/>
+          </p15:clr>
+        </p15:guide>
+        <p15:guide id="3" pos="3402">
+          <p15:clr>
+            <a:srgbClr val="E46962"/>
+          </p15:clr>
+        </p15:guide>
+      </p15:sldGuideLst>
+    </p:ext>
+  </p:extLst>
 </p:sldLayout>
 </file>
 
@@ -6234,7 +6418,7 @@
     </p:bg>
     <p:spTree>
       <p:nvGrpSpPr>
-        <p:cNvPr id="103" name="Shape 103"/>
+        <p:cNvPr id="106" name="Shape 106"/>
         <p:cNvGrpSpPr/>
         <p:nvPr/>
       </p:nvGrpSpPr>
@@ -6248,7 +6432,7 @@
       </p:grpSpPr>
       <p:sp>
         <p:nvSpPr>
-          <p:cNvPr id="104" name="Google Shape;104;p16"/>
+          <p:cNvPr id="107" name="Google Shape;107;p16"/>
           <p:cNvSpPr/>
           <p:nvPr/>
         </p:nvSpPr>
@@ -6291,7 +6475,7 @@
       </p:sp>
       <p:sp>
         <p:nvSpPr>
-          <p:cNvPr id="105" name="Google Shape;105;p16"/>
+          <p:cNvPr id="108" name="Google Shape;108;p16"/>
           <p:cNvSpPr/>
           <p:nvPr/>
         </p:nvSpPr>
@@ -6338,7 +6522,7 @@
       </p:sp>
       <p:sp>
         <p:nvSpPr>
-          <p:cNvPr id="106" name="Google Shape;106;p16"/>
+          <p:cNvPr id="109" name="Google Shape;109;p16"/>
           <p:cNvSpPr txBox="1"/>
           <p:nvPr>
             <p:ph idx="1" type="subTitle"/>
@@ -6490,7 +6674,7 @@
       </p:sp>
       <p:sp>
         <p:nvSpPr>
-          <p:cNvPr id="107" name="Google Shape;107;p16"/>
+          <p:cNvPr id="110" name="Google Shape;110;p16"/>
           <p:cNvSpPr txBox="1"/>
           <p:nvPr>
             <p:ph type="title"/>
@@ -6622,7 +6806,7 @@
       </p:sp>
       <p:pic>
         <p:nvPicPr>
-          <p:cNvPr id="108" name="Google Shape;108;p16"/>
+          <p:cNvPr id="111" name="Google Shape;111;p16"/>
           <p:cNvPicPr preferRelativeResize="0"/>
           <p:nvPr/>
         </p:nvPicPr>
@@ -6650,7 +6834,7 @@
       </p:pic>
       <p:pic>
         <p:nvPicPr>
-          <p:cNvPr id="109" name="Google Shape;109;p16"/>
+          <p:cNvPr id="112" name="Google Shape;112;p16"/>
           <p:cNvPicPr preferRelativeResize="0"/>
           <p:nvPr/>
         </p:nvPicPr>
@@ -6712,7 +6896,7 @@
     </p:bg>
     <p:spTree>
       <p:nvGrpSpPr>
-        <p:cNvPr id="110" name="Shape 110"/>
+        <p:cNvPr id="113" name="Shape 113"/>
         <p:cNvGrpSpPr/>
         <p:nvPr/>
       </p:nvGrpSpPr>
@@ -6726,7 +6910,7 @@
       </p:grpSpPr>
       <p:sp>
         <p:nvSpPr>
-          <p:cNvPr id="111" name="Google Shape;111;p17"/>
+          <p:cNvPr id="114" name="Google Shape;114;p17"/>
           <p:cNvSpPr/>
           <p:nvPr/>
         </p:nvSpPr>
@@ -6769,7 +6953,7 @@
       </p:sp>
       <p:sp>
         <p:nvSpPr>
-          <p:cNvPr id="112" name="Google Shape;112;p17"/>
+          <p:cNvPr id="115" name="Google Shape;115;p17"/>
           <p:cNvSpPr/>
           <p:nvPr/>
         </p:nvSpPr>
@@ -6816,7 +7000,7 @@
       </p:sp>
       <p:sp>
         <p:nvSpPr>
-          <p:cNvPr id="113" name="Google Shape;113;p17"/>
+          <p:cNvPr id="116" name="Google Shape;116;p17"/>
           <p:cNvSpPr txBox="1"/>
           <p:nvPr>
             <p:ph idx="1" type="subTitle"/>
@@ -6968,7 +7152,7 @@
       </p:sp>
       <p:pic>
         <p:nvPicPr>
-          <p:cNvPr id="114" name="Google Shape;114;p17"/>
+          <p:cNvPr id="117" name="Google Shape;117;p17"/>
           <p:cNvPicPr preferRelativeResize="0"/>
           <p:nvPr/>
         </p:nvPicPr>
@@ -6996,7 +7180,7 @@
       </p:pic>
       <p:pic>
         <p:nvPicPr>
-          <p:cNvPr id="115" name="Google Shape;115;p17"/>
+          <p:cNvPr id="118" name="Google Shape;118;p17"/>
           <p:cNvPicPr preferRelativeResize="0"/>
           <p:nvPr/>
         </p:nvPicPr>
@@ -7024,7 +7208,7 @@
       </p:pic>
       <p:sp>
         <p:nvSpPr>
-          <p:cNvPr id="116" name="Google Shape;116;p17"/>
+          <p:cNvPr id="119" name="Google Shape;119;p17"/>
           <p:cNvSpPr txBox="1"/>
           <p:nvPr/>
         </p:nvSpPr>
@@ -7109,7 +7293,7 @@
   <p:cSld name="BLANK">
     <p:spTree>
       <p:nvGrpSpPr>
-        <p:cNvPr id="117" name="Shape 117"/>
+        <p:cNvPr id="120" name="Shape 120"/>
         <p:cNvGrpSpPr/>
         <p:nvPr/>
       </p:nvGrpSpPr>
@@ -7141,7 +7325,7 @@
     </p:bg>
     <p:spTree>
       <p:nvGrpSpPr>
-        <p:cNvPr id="118" name="Shape 118"/>
+        <p:cNvPr id="121" name="Shape 121"/>
         <p:cNvGrpSpPr/>
         <p:nvPr/>
       </p:nvGrpSpPr>
@@ -12956,7 +13140,7 @@
   <p:cSld>
     <p:spTree>
       <p:nvGrpSpPr>
-        <p:cNvPr id="122" name="Shape 122"/>
+        <p:cNvPr id="125" name="Shape 125"/>
         <p:cNvGrpSpPr/>
         <p:nvPr/>
       </p:nvGrpSpPr>
@@ -12970,7 +13154,7 @@
       </p:grpSpPr>
       <p:sp>
         <p:nvSpPr>
-          <p:cNvPr id="123" name="Google Shape;123;p20"/>
+          <p:cNvPr id="126" name="Google Shape;126;p20"/>
           <p:cNvSpPr txBox="1"/>
           <p:nvPr>
             <p:ph type="ctrTitle"/>
@@ -13010,7 +13194,7 @@
       </p:sp>
       <p:sp>
         <p:nvSpPr>
-          <p:cNvPr id="124" name="Google Shape;124;p20"/>
+          <p:cNvPr id="127" name="Google Shape;127;p20"/>
           <p:cNvSpPr txBox="1"/>
           <p:nvPr>
             <p:ph idx="1" type="subTitle"/>
@@ -13061,7 +13245,7 @@
   <p:cSld>
     <p:spTree>
       <p:nvGrpSpPr>
-        <p:cNvPr id="187" name="Shape 187"/>
+        <p:cNvPr id="190" name="Shape 190"/>
         <p:cNvGrpSpPr/>
         <p:nvPr/>
       </p:nvGrpSpPr>
@@ -13075,7 +13259,7 @@
       </p:grpSpPr>
       <p:sp>
         <p:nvSpPr>
-          <p:cNvPr id="188" name="Google Shape;188;p29"/>
+          <p:cNvPr id="191" name="Google Shape;191;p29"/>
           <p:cNvSpPr txBox="1"/>
           <p:nvPr>
             <p:ph type="title"/>
@@ -13114,7 +13298,7 @@
       </p:sp>
       <p:sp>
         <p:nvSpPr>
-          <p:cNvPr id="189" name="Google Shape;189;p29"/>
+          <p:cNvPr id="192" name="Google Shape;192;p29"/>
           <p:cNvSpPr txBox="1"/>
           <p:nvPr>
             <p:ph idx="1" type="body"/>
@@ -13164,7 +13348,7 @@
   <p:cSld>
     <p:spTree>
       <p:nvGrpSpPr>
-        <p:cNvPr id="193" name="Shape 193"/>
+        <p:cNvPr id="196" name="Shape 196"/>
         <p:cNvGrpSpPr/>
         <p:nvPr/>
       </p:nvGrpSpPr>
@@ -13178,7 +13362,7 @@
       </p:grpSpPr>
       <p:sp>
         <p:nvSpPr>
-          <p:cNvPr id="194" name="Google Shape;194;p30"/>
+          <p:cNvPr id="197" name="Google Shape;197;p30"/>
           <p:cNvSpPr txBox="1"/>
           <p:nvPr>
             <p:ph idx="1" type="subTitle"/>
@@ -13217,7 +13401,7 @@
       </p:sp>
       <p:sp>
         <p:nvSpPr>
-          <p:cNvPr id="195" name="Google Shape;195;p30"/>
+          <p:cNvPr id="198" name="Google Shape;198;p30"/>
           <p:cNvSpPr txBox="1"/>
           <p:nvPr>
             <p:ph type="title"/>
@@ -13267,7 +13451,7 @@
   <p:cSld>
     <p:spTree>
       <p:nvGrpSpPr>
-        <p:cNvPr id="199" name="Shape 199"/>
+        <p:cNvPr id="202" name="Shape 202"/>
         <p:cNvGrpSpPr/>
         <p:nvPr/>
       </p:nvGrpSpPr>
@@ -13281,7 +13465,7 @@
       </p:grpSpPr>
       <p:sp>
         <p:nvSpPr>
-          <p:cNvPr id="200" name="Google Shape;200;p31"/>
+          <p:cNvPr id="203" name="Google Shape;203;p31"/>
           <p:cNvSpPr txBox="1"/>
           <p:nvPr>
             <p:ph idx="1" type="subTitle"/>
@@ -13320,7 +13504,7 @@
       </p:sp>
       <p:sp>
         <p:nvSpPr>
-          <p:cNvPr id="201" name="Google Shape;201;p31"/>
+          <p:cNvPr id="204" name="Google Shape;204;p31"/>
           <p:cNvSpPr txBox="1"/>
           <p:nvPr>
             <p:ph type="title"/>
@@ -13370,7 +13554,7 @@
   <p:cSld>
     <p:spTree>
       <p:nvGrpSpPr>
-        <p:cNvPr id="205" name="Shape 205"/>
+        <p:cNvPr id="208" name="Shape 208"/>
         <p:cNvGrpSpPr/>
         <p:nvPr/>
       </p:nvGrpSpPr>
@@ -13384,7 +13568,7 @@
       </p:grpSpPr>
       <p:sp>
         <p:nvSpPr>
-          <p:cNvPr id="206" name="Google Shape;206;p32"/>
+          <p:cNvPr id="209" name="Google Shape;209;p32"/>
           <p:cNvSpPr txBox="1"/>
           <p:nvPr>
             <p:ph type="title"/>
@@ -13423,7 +13607,7 @@
       </p:sp>
       <p:sp>
         <p:nvSpPr>
-          <p:cNvPr id="207" name="Google Shape;207;p32"/>
+          <p:cNvPr id="210" name="Google Shape;210;p32"/>
           <p:cNvSpPr txBox="1"/>
           <p:nvPr>
             <p:ph idx="1" type="body"/>
@@ -13473,7 +13657,7 @@
   <p:cSld>
     <p:spTree>
       <p:nvGrpSpPr>
-        <p:cNvPr id="211" name="Shape 211"/>
+        <p:cNvPr id="214" name="Shape 214"/>
         <p:cNvGrpSpPr/>
         <p:nvPr/>
       </p:nvGrpSpPr>
@@ -13487,7 +13671,7 @@
       </p:grpSpPr>
       <p:sp>
         <p:nvSpPr>
-          <p:cNvPr id="212" name="Google Shape;212;p33"/>
+          <p:cNvPr id="215" name="Google Shape;215;p33"/>
           <p:cNvSpPr txBox="1"/>
           <p:nvPr>
             <p:ph type="title"/>
@@ -13526,7 +13710,7 @@
       </p:sp>
       <p:sp>
         <p:nvSpPr>
-          <p:cNvPr id="213" name="Google Shape;213;p33"/>
+          <p:cNvPr id="216" name="Google Shape;216;p33"/>
           <p:cNvSpPr txBox="1"/>
           <p:nvPr>
             <p:ph idx="1" type="body"/>
@@ -13576,7 +13760,7 @@
   <p:cSld>
     <p:spTree>
       <p:nvGrpSpPr>
-        <p:cNvPr id="217" name="Shape 217"/>
+        <p:cNvPr id="220" name="Shape 220"/>
         <p:cNvGrpSpPr/>
         <p:nvPr/>
       </p:nvGrpSpPr>
@@ -13590,7 +13774,7 @@
       </p:grpSpPr>
       <p:sp>
         <p:nvSpPr>
-          <p:cNvPr id="218" name="Google Shape;218;p34"/>
+          <p:cNvPr id="221" name="Google Shape;221;p34"/>
           <p:cNvSpPr txBox="1"/>
           <p:nvPr>
             <p:ph type="title"/>
@@ -13629,7 +13813,7 @@
       </p:sp>
       <p:sp>
         <p:nvSpPr>
-          <p:cNvPr id="219" name="Google Shape;219;p34"/>
+          <p:cNvPr id="222" name="Google Shape;222;p34"/>
           <p:cNvSpPr txBox="1"/>
           <p:nvPr>
             <p:ph idx="1" type="body"/>
@@ -13679,7 +13863,7 @@
   <p:cSld>
     <p:spTree>
       <p:nvGrpSpPr>
-        <p:cNvPr id="223" name="Shape 223"/>
+        <p:cNvPr id="226" name="Shape 226"/>
         <p:cNvGrpSpPr/>
         <p:nvPr/>
       </p:nvGrpSpPr>
@@ -13693,7 +13877,7 @@
       </p:grpSpPr>
       <p:sp>
         <p:nvSpPr>
-          <p:cNvPr id="224" name="Google Shape;224;p35"/>
+          <p:cNvPr id="227" name="Google Shape;227;p35"/>
           <p:cNvSpPr txBox="1"/>
           <p:nvPr>
             <p:ph type="title"/>
@@ -13732,7 +13916,7 @@
       </p:sp>
       <p:sp>
         <p:nvSpPr>
-          <p:cNvPr id="225" name="Google Shape;225;p35"/>
+          <p:cNvPr id="228" name="Google Shape;228;p35"/>
           <p:cNvSpPr txBox="1"/>
           <p:nvPr>
             <p:ph idx="1" type="body"/>
@@ -13782,7 +13966,7 @@
   <p:cSld>
     <p:spTree>
       <p:nvGrpSpPr>
-        <p:cNvPr id="128" name="Shape 128"/>
+        <p:cNvPr id="131" name="Shape 131"/>
         <p:cNvGrpSpPr/>
         <p:nvPr/>
       </p:nvGrpSpPr>
@@ -13796,7 +13980,7 @@
       </p:grpSpPr>
       <p:sp>
         <p:nvSpPr>
-          <p:cNvPr id="129" name="Google Shape;129;p21"/>
+          <p:cNvPr id="132" name="Google Shape;132;p21"/>
           <p:cNvSpPr txBox="1"/>
           <p:nvPr>
             <p:ph idx="1" type="subTitle"/>
@@ -13835,7 +14019,7 @@
       </p:sp>
       <p:sp>
         <p:nvSpPr>
-          <p:cNvPr id="130" name="Google Shape;130;p21"/>
+          <p:cNvPr id="133" name="Google Shape;133;p21"/>
           <p:cNvSpPr txBox="1"/>
           <p:nvPr>
             <p:ph type="ctrTitle"/>
@@ -13885,7 +14069,7 @@
   <p:cSld>
     <p:spTree>
       <p:nvGrpSpPr>
-        <p:cNvPr id="134" name="Shape 134"/>
+        <p:cNvPr id="137" name="Shape 137"/>
         <p:cNvGrpSpPr/>
         <p:nvPr/>
       </p:nvGrpSpPr>
@@ -13910,7 +14094,7 @@
   <p:cSld>
     <p:spTree>
       <p:nvGrpSpPr>
-        <p:cNvPr id="138" name="Shape 138"/>
+        <p:cNvPr id="141" name="Shape 141"/>
         <p:cNvGrpSpPr/>
         <p:nvPr/>
       </p:nvGrpSpPr>
@@ -13924,7 +14108,7 @@
       </p:grpSpPr>
       <p:sp>
         <p:nvSpPr>
-          <p:cNvPr id="139" name="Google Shape;139;p23"/>
+          <p:cNvPr id="142" name="Google Shape;142;p23"/>
           <p:cNvSpPr txBox="1"/>
           <p:nvPr>
             <p:ph type="title"/>
@@ -13941,123 +14125,6 @@
         </p:spPr>
         <p:txBody>
           <a:bodyPr anchorCtr="0" anchor="ctr" bIns="91425" lIns="91425" spcFirstLastPara="1" rIns="91425" wrap="square" tIns="91425">
-            <a:noAutofit/>
-          </a:bodyPr>
-          <a:lstStyle/>
-          <a:p>
-            <a:pPr indent="0" lvl="0" marL="0" rtl="0" algn="l">
-              <a:spcBef>
-                <a:spcPts val="0"/>
-              </a:spcBef>
-              <a:spcAft>
-                <a:spcPts val="0"/>
-              </a:spcAft>
-              <a:buNone/>
-            </a:pPr>
-            <a:r>
-              <a:t/>
-            </a:r>
-            <a:endParaRPr/>
-          </a:p>
-        </p:txBody>
-      </p:sp>
-      <p:sp>
-        <p:nvSpPr>
-          <p:cNvPr id="140" name="Google Shape;140;p23"/>
-          <p:cNvSpPr txBox="1"/>
-          <p:nvPr>
-            <p:ph idx="1" type="subTitle"/>
-          </p:nvPr>
-        </p:nvSpPr>
-        <p:spPr>
-          <a:xfrm>
-            <a:off x="642025" y="2837925"/>
-            <a:ext cx="3366600" cy="758400"/>
-          </a:xfrm>
-          <a:prstGeom prst="rect">
-            <a:avLst/>
-          </a:prstGeom>
-        </p:spPr>
-        <p:txBody>
-          <a:bodyPr anchorCtr="0" anchor="t" bIns="91425" lIns="91425" spcFirstLastPara="1" rIns="91425" wrap="square" tIns="91425">
-            <a:noAutofit/>
-          </a:bodyPr>
-          <a:lstStyle/>
-          <a:p>
-            <a:pPr indent="0" lvl="0" marL="0" rtl="0" algn="l">
-              <a:spcBef>
-                <a:spcPts val="0"/>
-              </a:spcBef>
-              <a:spcAft>
-                <a:spcPts val="0"/>
-              </a:spcAft>
-              <a:buNone/>
-            </a:pPr>
-            <a:r>
-              <a:t/>
-            </a:r>
-            <a:endParaRPr/>
-          </a:p>
-        </p:txBody>
-      </p:sp>
-      <p:sp>
-        <p:nvSpPr>
-          <p:cNvPr id="141" name="Google Shape;141;p23"/>
-          <p:cNvSpPr txBox="1"/>
-          <p:nvPr>
-            <p:ph idx="2" type="subTitle"/>
-          </p:nvPr>
-        </p:nvSpPr>
-        <p:spPr>
-          <a:xfrm>
-            <a:off x="617050" y="2209625"/>
-            <a:ext cx="3366600" cy="758400"/>
-          </a:xfrm>
-          <a:prstGeom prst="rect">
-            <a:avLst/>
-          </a:prstGeom>
-        </p:spPr>
-        <p:txBody>
-          <a:bodyPr anchorCtr="0" anchor="b" bIns="91425" lIns="91425" spcFirstLastPara="1" rIns="91425" wrap="square" tIns="91425">
-            <a:noAutofit/>
-          </a:bodyPr>
-          <a:lstStyle/>
-          <a:p>
-            <a:pPr indent="0" lvl="0" marL="0" rtl="0" algn="l">
-              <a:spcBef>
-                <a:spcPts val="0"/>
-              </a:spcBef>
-              <a:spcAft>
-                <a:spcPts val="0"/>
-              </a:spcAft>
-              <a:buNone/>
-            </a:pPr>
-            <a:r>
-              <a:t/>
-            </a:r>
-            <a:endParaRPr/>
-          </a:p>
-        </p:txBody>
-      </p:sp>
-      <p:sp>
-        <p:nvSpPr>
-          <p:cNvPr id="142" name="Google Shape;142;p23"/>
-          <p:cNvSpPr txBox="1"/>
-          <p:nvPr>
-            <p:ph idx="3" type="subTitle"/>
-          </p:nvPr>
-        </p:nvSpPr>
-        <p:spPr>
-          <a:xfrm>
-            <a:off x="5098950" y="2821200"/>
-            <a:ext cx="3366600" cy="758400"/>
-          </a:xfrm>
-          <a:prstGeom prst="rect">
-            <a:avLst/>
-          </a:prstGeom>
-        </p:spPr>
-        <p:txBody>
-          <a:bodyPr anchorCtr="0" anchor="t" bIns="91425" lIns="91425" spcFirstLastPara="1" rIns="91425" wrap="square" tIns="91425">
             <a:noAutofit/>
           </a:bodyPr>
           <a:lstStyle/>
@@ -14083,12 +14150,12 @@
           <p:cNvPr id="143" name="Google Shape;143;p23"/>
           <p:cNvSpPr txBox="1"/>
           <p:nvPr>
-            <p:ph idx="4" type="subTitle"/>
+            <p:ph idx="1" type="subTitle"/>
           </p:nvPr>
         </p:nvSpPr>
         <p:spPr>
           <a:xfrm>
-            <a:off x="5077475" y="2231925"/>
+            <a:off x="642025" y="2837925"/>
             <a:ext cx="3366600" cy="758400"/>
           </a:xfrm>
           <a:prstGeom prst="rect">
@@ -14096,7 +14163,7 @@
           </a:prstGeom>
         </p:spPr>
         <p:txBody>
-          <a:bodyPr anchorCtr="0" anchor="b" bIns="91425" lIns="91425" spcFirstLastPara="1" rIns="91425" wrap="square" tIns="91425">
+          <a:bodyPr anchorCtr="0" anchor="t" bIns="91425" lIns="91425" spcFirstLastPara="1" rIns="91425" wrap="square" tIns="91425">
             <a:noAutofit/>
           </a:bodyPr>
           <a:lstStyle/>
@@ -14122,12 +14189,12 @@
           <p:cNvPr id="144" name="Google Shape;144;p23"/>
           <p:cNvSpPr txBox="1"/>
           <p:nvPr>
-            <p:ph idx="5" type="subTitle"/>
+            <p:ph idx="2" type="subTitle"/>
           </p:nvPr>
         </p:nvSpPr>
         <p:spPr>
           <a:xfrm>
-            <a:off x="642025" y="5031775"/>
+            <a:off x="617050" y="2209625"/>
             <a:ext cx="3366600" cy="758400"/>
           </a:xfrm>
           <a:prstGeom prst="rect">
@@ -14135,7 +14202,7 @@
           </a:prstGeom>
         </p:spPr>
         <p:txBody>
-          <a:bodyPr anchorCtr="0" anchor="t" bIns="91425" lIns="91425" spcFirstLastPara="1" rIns="91425" wrap="square" tIns="91425">
+          <a:bodyPr anchorCtr="0" anchor="b" bIns="91425" lIns="91425" spcFirstLastPara="1" rIns="91425" wrap="square" tIns="91425">
             <a:noAutofit/>
           </a:bodyPr>
           <a:lstStyle/>
@@ -14161,20 +14228,20 @@
           <p:cNvPr id="145" name="Google Shape;145;p23"/>
           <p:cNvSpPr txBox="1"/>
           <p:nvPr>
-            <p:ph idx="6" type="subTitle"/>
+            <p:ph idx="3" type="subTitle"/>
           </p:nvPr>
         </p:nvSpPr>
         <p:spPr>
           <a:xfrm>
-            <a:off x="642025" y="4379950"/>
-            <a:ext cx="3323400" cy="758400"/>
+            <a:off x="5098950" y="2821200"/>
+            <a:ext cx="3366600" cy="758400"/>
           </a:xfrm>
           <a:prstGeom prst="rect">
             <a:avLst/>
           </a:prstGeom>
         </p:spPr>
         <p:txBody>
-          <a:bodyPr anchorCtr="0" anchor="b" bIns="91425" lIns="91425" spcFirstLastPara="1" rIns="91425" wrap="square" tIns="91425">
+          <a:bodyPr anchorCtr="0" anchor="t" bIns="91425" lIns="91425" spcFirstLastPara="1" rIns="91425" wrap="square" tIns="91425">
             <a:noAutofit/>
           </a:bodyPr>
           <a:lstStyle/>
@@ -14200,12 +14267,12 @@
           <p:cNvPr id="146" name="Google Shape;146;p23"/>
           <p:cNvSpPr txBox="1"/>
           <p:nvPr>
-            <p:ph idx="7" type="subTitle"/>
+            <p:ph idx="4" type="subTitle"/>
           </p:nvPr>
         </p:nvSpPr>
         <p:spPr>
           <a:xfrm>
-            <a:off x="5120550" y="5031775"/>
+            <a:off x="5077475" y="2231925"/>
             <a:ext cx="3366600" cy="758400"/>
           </a:xfrm>
           <a:prstGeom prst="rect">
@@ -14213,7 +14280,7 @@
           </a:prstGeom>
         </p:spPr>
         <p:txBody>
-          <a:bodyPr anchorCtr="0" anchor="t" bIns="91425" lIns="91425" spcFirstLastPara="1" rIns="91425" wrap="square" tIns="91425">
+          <a:bodyPr anchorCtr="0" anchor="b" bIns="91425" lIns="91425" spcFirstLastPara="1" rIns="91425" wrap="square" tIns="91425">
             <a:noAutofit/>
           </a:bodyPr>
           <a:lstStyle/>
@@ -14237,6 +14304,123 @@
       <p:sp>
         <p:nvSpPr>
           <p:cNvPr id="147" name="Google Shape;147;p23"/>
+          <p:cNvSpPr txBox="1"/>
+          <p:nvPr>
+            <p:ph idx="5" type="subTitle"/>
+          </p:nvPr>
+        </p:nvSpPr>
+        <p:spPr>
+          <a:xfrm>
+            <a:off x="642025" y="5031775"/>
+            <a:ext cx="3366600" cy="758400"/>
+          </a:xfrm>
+          <a:prstGeom prst="rect">
+            <a:avLst/>
+          </a:prstGeom>
+        </p:spPr>
+        <p:txBody>
+          <a:bodyPr anchorCtr="0" anchor="t" bIns="91425" lIns="91425" spcFirstLastPara="1" rIns="91425" wrap="square" tIns="91425">
+            <a:noAutofit/>
+          </a:bodyPr>
+          <a:lstStyle/>
+          <a:p>
+            <a:pPr indent="0" lvl="0" marL="0" rtl="0" algn="l">
+              <a:spcBef>
+                <a:spcPts val="0"/>
+              </a:spcBef>
+              <a:spcAft>
+                <a:spcPts val="0"/>
+              </a:spcAft>
+              <a:buNone/>
+            </a:pPr>
+            <a:r>
+              <a:t/>
+            </a:r>
+            <a:endParaRPr/>
+          </a:p>
+        </p:txBody>
+      </p:sp>
+      <p:sp>
+        <p:nvSpPr>
+          <p:cNvPr id="148" name="Google Shape;148;p23"/>
+          <p:cNvSpPr txBox="1"/>
+          <p:nvPr>
+            <p:ph idx="6" type="subTitle"/>
+          </p:nvPr>
+        </p:nvSpPr>
+        <p:spPr>
+          <a:xfrm>
+            <a:off x="642025" y="4379950"/>
+            <a:ext cx="3323400" cy="758400"/>
+          </a:xfrm>
+          <a:prstGeom prst="rect">
+            <a:avLst/>
+          </a:prstGeom>
+        </p:spPr>
+        <p:txBody>
+          <a:bodyPr anchorCtr="0" anchor="b" bIns="91425" lIns="91425" spcFirstLastPara="1" rIns="91425" wrap="square" tIns="91425">
+            <a:noAutofit/>
+          </a:bodyPr>
+          <a:lstStyle/>
+          <a:p>
+            <a:pPr indent="0" lvl="0" marL="0" rtl="0" algn="l">
+              <a:spcBef>
+                <a:spcPts val="0"/>
+              </a:spcBef>
+              <a:spcAft>
+                <a:spcPts val="0"/>
+              </a:spcAft>
+              <a:buNone/>
+            </a:pPr>
+            <a:r>
+              <a:t/>
+            </a:r>
+            <a:endParaRPr/>
+          </a:p>
+        </p:txBody>
+      </p:sp>
+      <p:sp>
+        <p:nvSpPr>
+          <p:cNvPr id="149" name="Google Shape;149;p23"/>
+          <p:cNvSpPr txBox="1"/>
+          <p:nvPr>
+            <p:ph idx="7" type="subTitle"/>
+          </p:nvPr>
+        </p:nvSpPr>
+        <p:spPr>
+          <a:xfrm>
+            <a:off x="5120550" y="5031775"/>
+            <a:ext cx="3366600" cy="758400"/>
+          </a:xfrm>
+          <a:prstGeom prst="rect">
+            <a:avLst/>
+          </a:prstGeom>
+        </p:spPr>
+        <p:txBody>
+          <a:bodyPr anchorCtr="0" anchor="t" bIns="91425" lIns="91425" spcFirstLastPara="1" rIns="91425" wrap="square" tIns="91425">
+            <a:noAutofit/>
+          </a:bodyPr>
+          <a:lstStyle/>
+          <a:p>
+            <a:pPr indent="0" lvl="0" marL="0" rtl="0" algn="l">
+              <a:spcBef>
+                <a:spcPts val="0"/>
+              </a:spcBef>
+              <a:spcAft>
+                <a:spcPts val="0"/>
+              </a:spcAft>
+              <a:buNone/>
+            </a:pPr>
+            <a:r>
+              <a:t/>
+            </a:r>
+            <a:endParaRPr/>
+          </a:p>
+        </p:txBody>
+      </p:sp>
+      <p:sp>
+        <p:nvSpPr>
+          <p:cNvPr id="150" name="Google Shape;150;p23"/>
           <p:cNvSpPr txBox="1"/>
           <p:nvPr>
             <p:ph idx="8" type="subTitle"/>
@@ -14286,7 +14470,7 @@
   <p:cSld>
     <p:spTree>
       <p:nvGrpSpPr>
-        <p:cNvPr id="151" name="Shape 151"/>
+        <p:cNvPr id="154" name="Shape 154"/>
         <p:cNvGrpSpPr/>
         <p:nvPr/>
       </p:nvGrpSpPr>
@@ -14300,7 +14484,7 @@
       </p:grpSpPr>
       <p:sp>
         <p:nvSpPr>
-          <p:cNvPr id="152" name="Google Shape;152;p24"/>
+          <p:cNvPr id="155" name="Google Shape;155;p24"/>
           <p:cNvSpPr txBox="1"/>
           <p:nvPr>
             <p:ph type="title"/>
@@ -14317,123 +14501,6 @@
         </p:spPr>
         <p:txBody>
           <a:bodyPr anchorCtr="0" anchor="ctr" bIns="91425" lIns="91425" spcFirstLastPara="1" rIns="91425" wrap="square" tIns="91425">
-            <a:noAutofit/>
-          </a:bodyPr>
-          <a:lstStyle/>
-          <a:p>
-            <a:pPr indent="0" lvl="0" marL="0" rtl="0" algn="l">
-              <a:spcBef>
-                <a:spcPts val="0"/>
-              </a:spcBef>
-              <a:spcAft>
-                <a:spcPts val="0"/>
-              </a:spcAft>
-              <a:buNone/>
-            </a:pPr>
-            <a:r>
-              <a:t/>
-            </a:r>
-            <a:endParaRPr/>
-          </a:p>
-        </p:txBody>
-      </p:sp>
-      <p:sp>
-        <p:nvSpPr>
-          <p:cNvPr id="153" name="Google Shape;153;p24"/>
-          <p:cNvSpPr txBox="1"/>
-          <p:nvPr>
-            <p:ph idx="1" type="subTitle"/>
-          </p:nvPr>
-        </p:nvSpPr>
-        <p:spPr>
-          <a:xfrm>
-            <a:off x="642025" y="2837925"/>
-            <a:ext cx="3366600" cy="758400"/>
-          </a:xfrm>
-          <a:prstGeom prst="rect">
-            <a:avLst/>
-          </a:prstGeom>
-        </p:spPr>
-        <p:txBody>
-          <a:bodyPr anchorCtr="0" anchor="t" bIns="91425" lIns="91425" spcFirstLastPara="1" rIns="91425" wrap="square" tIns="91425">
-            <a:noAutofit/>
-          </a:bodyPr>
-          <a:lstStyle/>
-          <a:p>
-            <a:pPr indent="0" lvl="0" marL="0" rtl="0" algn="l">
-              <a:spcBef>
-                <a:spcPts val="0"/>
-              </a:spcBef>
-              <a:spcAft>
-                <a:spcPts val="0"/>
-              </a:spcAft>
-              <a:buNone/>
-            </a:pPr>
-            <a:r>
-              <a:t/>
-            </a:r>
-            <a:endParaRPr/>
-          </a:p>
-        </p:txBody>
-      </p:sp>
-      <p:sp>
-        <p:nvSpPr>
-          <p:cNvPr id="154" name="Google Shape;154;p24"/>
-          <p:cNvSpPr txBox="1"/>
-          <p:nvPr>
-            <p:ph idx="2" type="subTitle"/>
-          </p:nvPr>
-        </p:nvSpPr>
-        <p:spPr>
-          <a:xfrm>
-            <a:off x="617050" y="2209625"/>
-            <a:ext cx="3366600" cy="758400"/>
-          </a:xfrm>
-          <a:prstGeom prst="rect">
-            <a:avLst/>
-          </a:prstGeom>
-        </p:spPr>
-        <p:txBody>
-          <a:bodyPr anchorCtr="0" anchor="b" bIns="91425" lIns="91425" spcFirstLastPara="1" rIns="91425" wrap="square" tIns="91425">
-            <a:noAutofit/>
-          </a:bodyPr>
-          <a:lstStyle/>
-          <a:p>
-            <a:pPr indent="0" lvl="0" marL="0" rtl="0" algn="l">
-              <a:spcBef>
-                <a:spcPts val="0"/>
-              </a:spcBef>
-              <a:spcAft>
-                <a:spcPts val="0"/>
-              </a:spcAft>
-              <a:buNone/>
-            </a:pPr>
-            <a:r>
-              <a:t/>
-            </a:r>
-            <a:endParaRPr/>
-          </a:p>
-        </p:txBody>
-      </p:sp>
-      <p:sp>
-        <p:nvSpPr>
-          <p:cNvPr id="155" name="Google Shape;155;p24"/>
-          <p:cNvSpPr txBox="1"/>
-          <p:nvPr>
-            <p:ph idx="3" type="subTitle"/>
-          </p:nvPr>
-        </p:nvSpPr>
-        <p:spPr>
-          <a:xfrm>
-            <a:off x="5098950" y="2821200"/>
-            <a:ext cx="3366600" cy="758400"/>
-          </a:xfrm>
-          <a:prstGeom prst="rect">
-            <a:avLst/>
-          </a:prstGeom>
-        </p:spPr>
-        <p:txBody>
-          <a:bodyPr anchorCtr="0" anchor="t" bIns="91425" lIns="91425" spcFirstLastPara="1" rIns="91425" wrap="square" tIns="91425">
             <a:noAutofit/>
           </a:bodyPr>
           <a:lstStyle/>
@@ -14459,12 +14526,12 @@
           <p:cNvPr id="156" name="Google Shape;156;p24"/>
           <p:cNvSpPr txBox="1"/>
           <p:nvPr>
-            <p:ph idx="4" type="subTitle"/>
+            <p:ph idx="1" type="subTitle"/>
           </p:nvPr>
         </p:nvSpPr>
         <p:spPr>
           <a:xfrm>
-            <a:off x="5077475" y="2231925"/>
+            <a:off x="642025" y="2837925"/>
             <a:ext cx="3366600" cy="758400"/>
           </a:xfrm>
           <a:prstGeom prst="rect">
@@ -14472,7 +14539,7 @@
           </a:prstGeom>
         </p:spPr>
         <p:txBody>
-          <a:bodyPr anchorCtr="0" anchor="b" bIns="91425" lIns="91425" spcFirstLastPara="1" rIns="91425" wrap="square" tIns="91425">
+          <a:bodyPr anchorCtr="0" anchor="t" bIns="91425" lIns="91425" spcFirstLastPara="1" rIns="91425" wrap="square" tIns="91425">
             <a:noAutofit/>
           </a:bodyPr>
           <a:lstStyle/>
@@ -14498,12 +14565,12 @@
           <p:cNvPr id="157" name="Google Shape;157;p24"/>
           <p:cNvSpPr txBox="1"/>
           <p:nvPr>
-            <p:ph idx="5" type="subTitle"/>
+            <p:ph idx="2" type="subTitle"/>
           </p:nvPr>
         </p:nvSpPr>
         <p:spPr>
           <a:xfrm>
-            <a:off x="642025" y="5031775"/>
+            <a:off x="617050" y="2209625"/>
             <a:ext cx="3366600" cy="758400"/>
           </a:xfrm>
           <a:prstGeom prst="rect">
@@ -14511,7 +14578,7 @@
           </a:prstGeom>
         </p:spPr>
         <p:txBody>
-          <a:bodyPr anchorCtr="0" anchor="t" bIns="91425" lIns="91425" spcFirstLastPara="1" rIns="91425" wrap="square" tIns="91425">
+          <a:bodyPr anchorCtr="0" anchor="b" bIns="91425" lIns="91425" spcFirstLastPara="1" rIns="91425" wrap="square" tIns="91425">
             <a:noAutofit/>
           </a:bodyPr>
           <a:lstStyle/>
@@ -14537,20 +14604,20 @@
           <p:cNvPr id="158" name="Google Shape;158;p24"/>
           <p:cNvSpPr txBox="1"/>
           <p:nvPr>
-            <p:ph idx="6" type="subTitle"/>
+            <p:ph idx="3" type="subTitle"/>
           </p:nvPr>
         </p:nvSpPr>
         <p:spPr>
           <a:xfrm>
-            <a:off x="642025" y="4379950"/>
-            <a:ext cx="3323400" cy="758400"/>
+            <a:off x="5098950" y="2821200"/>
+            <a:ext cx="3366600" cy="758400"/>
           </a:xfrm>
           <a:prstGeom prst="rect">
             <a:avLst/>
           </a:prstGeom>
         </p:spPr>
         <p:txBody>
-          <a:bodyPr anchorCtr="0" anchor="b" bIns="91425" lIns="91425" spcFirstLastPara="1" rIns="91425" wrap="square" tIns="91425">
+          <a:bodyPr anchorCtr="0" anchor="t" bIns="91425" lIns="91425" spcFirstLastPara="1" rIns="91425" wrap="square" tIns="91425">
             <a:noAutofit/>
           </a:bodyPr>
           <a:lstStyle/>
@@ -14576,12 +14643,12 @@
           <p:cNvPr id="159" name="Google Shape;159;p24"/>
           <p:cNvSpPr txBox="1"/>
           <p:nvPr>
-            <p:ph idx="7" type="subTitle"/>
+            <p:ph idx="4" type="subTitle"/>
           </p:nvPr>
         </p:nvSpPr>
         <p:spPr>
           <a:xfrm>
-            <a:off x="5120550" y="5031775"/>
+            <a:off x="5077475" y="2231925"/>
             <a:ext cx="3366600" cy="758400"/>
           </a:xfrm>
           <a:prstGeom prst="rect">
@@ -14589,7 +14656,7 @@
           </a:prstGeom>
         </p:spPr>
         <p:txBody>
-          <a:bodyPr anchorCtr="0" anchor="t" bIns="91425" lIns="91425" spcFirstLastPara="1" rIns="91425" wrap="square" tIns="91425">
+          <a:bodyPr anchorCtr="0" anchor="b" bIns="91425" lIns="91425" spcFirstLastPara="1" rIns="91425" wrap="square" tIns="91425">
             <a:noAutofit/>
           </a:bodyPr>
           <a:lstStyle/>
@@ -14613,6 +14680,123 @@
       <p:sp>
         <p:nvSpPr>
           <p:cNvPr id="160" name="Google Shape;160;p24"/>
+          <p:cNvSpPr txBox="1"/>
+          <p:nvPr>
+            <p:ph idx="5" type="subTitle"/>
+          </p:nvPr>
+        </p:nvSpPr>
+        <p:spPr>
+          <a:xfrm>
+            <a:off x="642025" y="5031775"/>
+            <a:ext cx="3366600" cy="758400"/>
+          </a:xfrm>
+          <a:prstGeom prst="rect">
+            <a:avLst/>
+          </a:prstGeom>
+        </p:spPr>
+        <p:txBody>
+          <a:bodyPr anchorCtr="0" anchor="t" bIns="91425" lIns="91425" spcFirstLastPara="1" rIns="91425" wrap="square" tIns="91425">
+            <a:noAutofit/>
+          </a:bodyPr>
+          <a:lstStyle/>
+          <a:p>
+            <a:pPr indent="0" lvl="0" marL="0" rtl="0" algn="l">
+              <a:spcBef>
+                <a:spcPts val="0"/>
+              </a:spcBef>
+              <a:spcAft>
+                <a:spcPts val="0"/>
+              </a:spcAft>
+              <a:buNone/>
+            </a:pPr>
+            <a:r>
+              <a:t/>
+            </a:r>
+            <a:endParaRPr/>
+          </a:p>
+        </p:txBody>
+      </p:sp>
+      <p:sp>
+        <p:nvSpPr>
+          <p:cNvPr id="161" name="Google Shape;161;p24"/>
+          <p:cNvSpPr txBox="1"/>
+          <p:nvPr>
+            <p:ph idx="6" type="subTitle"/>
+          </p:nvPr>
+        </p:nvSpPr>
+        <p:spPr>
+          <a:xfrm>
+            <a:off x="642025" y="4379950"/>
+            <a:ext cx="3323400" cy="758400"/>
+          </a:xfrm>
+          <a:prstGeom prst="rect">
+            <a:avLst/>
+          </a:prstGeom>
+        </p:spPr>
+        <p:txBody>
+          <a:bodyPr anchorCtr="0" anchor="b" bIns="91425" lIns="91425" spcFirstLastPara="1" rIns="91425" wrap="square" tIns="91425">
+            <a:noAutofit/>
+          </a:bodyPr>
+          <a:lstStyle/>
+          <a:p>
+            <a:pPr indent="0" lvl="0" marL="0" rtl="0" algn="l">
+              <a:spcBef>
+                <a:spcPts val="0"/>
+              </a:spcBef>
+              <a:spcAft>
+                <a:spcPts val="0"/>
+              </a:spcAft>
+              <a:buNone/>
+            </a:pPr>
+            <a:r>
+              <a:t/>
+            </a:r>
+            <a:endParaRPr/>
+          </a:p>
+        </p:txBody>
+      </p:sp>
+      <p:sp>
+        <p:nvSpPr>
+          <p:cNvPr id="162" name="Google Shape;162;p24"/>
+          <p:cNvSpPr txBox="1"/>
+          <p:nvPr>
+            <p:ph idx="7" type="subTitle"/>
+          </p:nvPr>
+        </p:nvSpPr>
+        <p:spPr>
+          <a:xfrm>
+            <a:off x="5120550" y="5031775"/>
+            <a:ext cx="3366600" cy="758400"/>
+          </a:xfrm>
+          <a:prstGeom prst="rect">
+            <a:avLst/>
+          </a:prstGeom>
+        </p:spPr>
+        <p:txBody>
+          <a:bodyPr anchorCtr="0" anchor="t" bIns="91425" lIns="91425" spcFirstLastPara="1" rIns="91425" wrap="square" tIns="91425">
+            <a:noAutofit/>
+          </a:bodyPr>
+          <a:lstStyle/>
+          <a:p>
+            <a:pPr indent="0" lvl="0" marL="0" rtl="0" algn="l">
+              <a:spcBef>
+                <a:spcPts val="0"/>
+              </a:spcBef>
+              <a:spcAft>
+                <a:spcPts val="0"/>
+              </a:spcAft>
+              <a:buNone/>
+            </a:pPr>
+            <a:r>
+              <a:t/>
+            </a:r>
+            <a:endParaRPr/>
+          </a:p>
+        </p:txBody>
+      </p:sp>
+      <p:sp>
+        <p:nvSpPr>
+          <p:cNvPr id="163" name="Google Shape;163;p24"/>
           <p:cNvSpPr txBox="1"/>
           <p:nvPr>
             <p:ph idx="8" type="subTitle"/>
@@ -14662,7 +14846,7 @@
   <p:cSld>
     <p:spTree>
       <p:nvGrpSpPr>
-        <p:cNvPr id="164" name="Shape 164"/>
+        <p:cNvPr id="167" name="Shape 167"/>
         <p:cNvGrpSpPr/>
         <p:nvPr/>
       </p:nvGrpSpPr>
@@ -14676,7 +14860,7 @@
       </p:grpSpPr>
       <p:sp>
         <p:nvSpPr>
-          <p:cNvPr id="165" name="Google Shape;165;p25"/>
+          <p:cNvPr id="168" name="Google Shape;168;p25"/>
           <p:cNvSpPr txBox="1"/>
           <p:nvPr>
             <p:ph idx="1" type="subTitle"/>
@@ -14726,7 +14910,7 @@
   <p:cSld>
     <p:spTree>
       <p:nvGrpSpPr>
-        <p:cNvPr id="169" name="Shape 169"/>
+        <p:cNvPr id="172" name="Shape 172"/>
         <p:cNvGrpSpPr/>
         <p:nvPr/>
       </p:nvGrpSpPr>
@@ -14740,7 +14924,7 @@
       </p:grpSpPr>
       <p:sp>
         <p:nvSpPr>
-          <p:cNvPr id="170" name="Google Shape;170;p26"/>
+          <p:cNvPr id="173" name="Google Shape;173;p26"/>
           <p:cNvSpPr txBox="1"/>
           <p:nvPr>
             <p:ph type="title"/>
@@ -14779,7 +14963,7 @@
       </p:sp>
       <p:sp>
         <p:nvSpPr>
-          <p:cNvPr id="171" name="Google Shape;171;p26"/>
+          <p:cNvPr id="174" name="Google Shape;174;p26"/>
           <p:cNvSpPr txBox="1"/>
           <p:nvPr>
             <p:ph idx="2" type="title"/>
@@ -14829,7 +15013,7 @@
   <p:cSld>
     <p:spTree>
       <p:nvGrpSpPr>
-        <p:cNvPr id="175" name="Shape 175"/>
+        <p:cNvPr id="178" name="Shape 178"/>
         <p:cNvGrpSpPr/>
         <p:nvPr/>
       </p:nvGrpSpPr>
@@ -14843,7 +15027,7 @@
       </p:grpSpPr>
       <p:sp>
         <p:nvSpPr>
-          <p:cNvPr id="176" name="Google Shape;176;p27"/>
+          <p:cNvPr id="179" name="Google Shape;179;p27"/>
           <p:cNvSpPr txBox="1"/>
           <p:nvPr>
             <p:ph type="title"/>
@@ -14882,7 +15066,7 @@
       </p:sp>
       <p:sp>
         <p:nvSpPr>
-          <p:cNvPr id="177" name="Google Shape;177;p27"/>
+          <p:cNvPr id="180" name="Google Shape;180;p27"/>
           <p:cNvSpPr txBox="1"/>
           <p:nvPr>
             <p:ph idx="2" type="title"/>
@@ -14932,7 +15116,7 @@
   <p:cSld>
     <p:spTree>
       <p:nvGrpSpPr>
-        <p:cNvPr id="181" name="Shape 181"/>
+        <p:cNvPr id="184" name="Shape 184"/>
         <p:cNvGrpSpPr/>
         <p:nvPr/>
       </p:nvGrpSpPr>
@@ -14946,7 +15130,7 @@
       </p:grpSpPr>
       <p:sp>
         <p:nvSpPr>
-          <p:cNvPr id="182" name="Google Shape;182;p28"/>
+          <p:cNvPr id="185" name="Google Shape;185;p28"/>
           <p:cNvSpPr txBox="1"/>
           <p:nvPr>
             <p:ph type="title"/>
@@ -14985,7 +15169,7 @@
       </p:sp>
       <p:sp>
         <p:nvSpPr>
-          <p:cNvPr id="183" name="Google Shape;183;p28"/>
+          <p:cNvPr id="186" name="Google Shape;186;p28"/>
           <p:cNvSpPr txBox="1"/>
           <p:nvPr>
             <p:ph idx="1" type="body"/>
@@ -15031,6 +15215,285 @@
 </file>
 
 <file path=ppt/theme/theme1.xml><?xml version="1.0" encoding="utf-8"?>
+<a:theme xmlns:a="http://schemas.openxmlformats.org/drawingml/2006/main" xmlns:r="http://schemas.openxmlformats.org/officeDocument/2006/relationships" name="Live de python">
+  <a:themeElements>
+    <a:clrScheme name="Simple Light">
+      <a:dk1>
+        <a:srgbClr val="2A2A2A"/>
+      </a:dk1>
+      <a:lt1>
+        <a:srgbClr val="FEDD8E"/>
+      </a:lt1>
+      <a:dk2>
+        <a:srgbClr val="FF8E7B"/>
+      </a:dk2>
+      <a:lt2>
+        <a:srgbClr val="2A2A2A"/>
+      </a:lt2>
+      <a:accent1>
+        <a:srgbClr val="FEDD8E"/>
+      </a:accent1>
+      <a:accent2>
+        <a:srgbClr val="FF8E7B"/>
+      </a:accent2>
+      <a:accent3>
+        <a:srgbClr val="2A2A2A"/>
+      </a:accent3>
+      <a:accent4>
+        <a:srgbClr val="FEDD8E"/>
+      </a:accent4>
+      <a:accent5>
+        <a:srgbClr val="FF8E7B"/>
+      </a:accent5>
+      <a:accent6>
+        <a:srgbClr val="FEDD8E"/>
+      </a:accent6>
+      <a:hlink>
+        <a:srgbClr val="2A2A2A"/>
+      </a:hlink>
+      <a:folHlink>
+        <a:srgbClr val="0097A7"/>
+      </a:folHlink>
+    </a:clrScheme>
+    <a:fontScheme name="Office">
+      <a:majorFont>
+        <a:latin typeface="Arial"/>
+        <a:ea typeface=""/>
+        <a:cs typeface=""/>
+        <a:font script="Jpan" typeface="ＭＳ Ｐゴシック"/>
+        <a:font script="Hang" typeface="맑은 고딕"/>
+        <a:font script="Hans" typeface="宋体"/>
+        <a:font script="Hant" typeface="新細明體"/>
+        <a:font script="Arab" typeface="Times New Roman"/>
+        <a:font script="Hebr" typeface="Times New Roman"/>
+        <a:font script="Thai" typeface="Angsana New"/>
+        <a:font script="Ethi" typeface="Nyala"/>
+        <a:font script="Beng" typeface="Vrinda"/>
+        <a:font script="Gujr" typeface="Shruti"/>
+        <a:font script="Khmr" typeface="MoolBoran"/>
+        <a:font script="Knda" typeface="Tunga"/>
+        <a:font script="Guru" typeface="Raavi"/>
+        <a:font script="Cans" typeface="Euphemia"/>
+        <a:font script="Cher" typeface="Plantagenet Cherokee"/>
+        <a:font script="Yiii" typeface="Microsoft Yi Baiti"/>
+        <a:font script="Tibt" typeface="Microsoft Himalaya"/>
+        <a:font script="Thaa" typeface="MV Boli"/>
+        <a:font script="Deva" typeface="Mangal"/>
+        <a:font script="Telu" typeface="Gautami"/>
+        <a:font script="Taml" typeface="Latha"/>
+        <a:font script="Syrc" typeface="Estrangelo Edessa"/>
+        <a:font script="Orya" typeface="Kalinga"/>
+        <a:font script="Mlym" typeface="Kartika"/>
+        <a:font script="Laoo" typeface="DokChampa"/>
+        <a:font script="Sinh" typeface="Iskoola Pota"/>
+        <a:font script="Mong" typeface="Mongolian Baiti"/>
+        <a:font script="Viet" typeface="Times New Roman"/>
+        <a:font script="Uigh" typeface="Microsoft Uighur"/>
+        <a:font script="Geor" typeface="Sylfaen"/>
+      </a:majorFont>
+      <a:minorFont>
+        <a:latin typeface="Arial"/>
+        <a:ea typeface=""/>
+        <a:cs typeface=""/>
+        <a:font script="Jpan" typeface="ＭＳ Ｐゴシック"/>
+        <a:font script="Hang" typeface="맑은 고딕"/>
+        <a:font script="Hans" typeface="宋体"/>
+        <a:font script="Hant" typeface="新細明體"/>
+        <a:font script="Arab" typeface="Arial"/>
+        <a:font script="Hebr" typeface="Arial"/>
+        <a:font script="Thai" typeface="Cordia New"/>
+        <a:font script="Ethi" typeface="Nyala"/>
+        <a:font script="Beng" typeface="Vrinda"/>
+        <a:font script="Gujr" typeface="Shruti"/>
+        <a:font script="Khmr" typeface="DaunPenh"/>
+        <a:font script="Knda" typeface="Tunga"/>
+        <a:font script="Guru" typeface="Raavi"/>
+        <a:font script="Cans" typeface="Euphemia"/>
+        <a:font script="Cher" typeface="Plantagenet Cherokee"/>
+        <a:font script="Yiii" typeface="Microsoft Yi Baiti"/>
+        <a:font script="Tibt" typeface="Microsoft Himalaya"/>
+        <a:font script="Thaa" typeface="MV Boli"/>
+        <a:font script="Deva" typeface="Mangal"/>
+        <a:font script="Telu" typeface="Gautami"/>
+        <a:font script="Taml" typeface="Latha"/>
+        <a:font script="Syrc" typeface="Estrangelo Edessa"/>
+        <a:font script="Orya" typeface="Kalinga"/>
+        <a:font script="Mlym" typeface="Kartika"/>
+        <a:font script="Laoo" typeface="DokChampa"/>
+        <a:font script="Sinh" typeface="Iskoola Pota"/>
+        <a:font script="Mong" typeface="Mongolian Baiti"/>
+        <a:font script="Viet" typeface="Arial"/>
+        <a:font script="Uigh" typeface="Microsoft Uighur"/>
+        <a:font script="Geor" typeface="Sylfaen"/>
+      </a:minorFont>
+    </a:fontScheme>
+    <a:fmtScheme name="Office">
+      <a:fillStyleLst>
+        <a:solidFill>
+          <a:schemeClr val="phClr"/>
+        </a:solidFill>
+        <a:gradFill rotWithShape="1">
+          <a:gsLst>
+            <a:gs pos="0">
+              <a:schemeClr val="phClr">
+                <a:tint val="50000"/>
+                <a:satMod val="300000"/>
+              </a:schemeClr>
+            </a:gs>
+            <a:gs pos="35000">
+              <a:schemeClr val="phClr">
+                <a:tint val="37000"/>
+                <a:satMod val="300000"/>
+              </a:schemeClr>
+            </a:gs>
+            <a:gs pos="100000">
+              <a:schemeClr val="phClr">
+                <a:tint val="15000"/>
+                <a:satMod val="350000"/>
+              </a:schemeClr>
+            </a:gs>
+          </a:gsLst>
+          <a:lin ang="16200000" scaled="1"/>
+        </a:gradFill>
+        <a:gradFill rotWithShape="1">
+          <a:gsLst>
+            <a:gs pos="0">
+              <a:schemeClr val="phClr">
+                <a:tint val="100000"/>
+                <a:shade val="100000"/>
+                <a:satMod val="130000"/>
+              </a:schemeClr>
+            </a:gs>
+            <a:gs pos="100000">
+              <a:schemeClr val="phClr">
+                <a:tint val="50000"/>
+                <a:shade val="100000"/>
+                <a:satMod val="350000"/>
+              </a:schemeClr>
+            </a:gs>
+          </a:gsLst>
+          <a:lin ang="16200000" scaled="0"/>
+        </a:gradFill>
+      </a:fillStyleLst>
+      <a:lnStyleLst>
+        <a:ln w="9525" cap="flat" cmpd="sng" algn="ctr">
+          <a:solidFill>
+            <a:schemeClr val="phClr">
+              <a:shade val="95000"/>
+              <a:satMod val="105000"/>
+            </a:schemeClr>
+          </a:solidFill>
+          <a:prstDash val="solid"/>
+        </a:ln>
+        <a:ln w="25400" cap="flat" cmpd="sng" algn="ctr">
+          <a:solidFill>
+            <a:schemeClr val="phClr"/>
+          </a:solidFill>
+          <a:prstDash val="solid"/>
+        </a:ln>
+        <a:ln w="38100" cap="flat" cmpd="sng" algn="ctr">
+          <a:solidFill>
+            <a:schemeClr val="phClr"/>
+          </a:solidFill>
+          <a:prstDash val="solid"/>
+        </a:ln>
+      </a:lnStyleLst>
+      <a:effectStyleLst>
+        <a:effectStyle>
+          <a:effectLst>
+            <a:outerShdw blurRad="40000" dist="20000" dir="5400000" rotWithShape="0">
+              <a:srgbClr val="000000">
+                <a:alpha val="38000"/>
+              </a:srgbClr>
+            </a:outerShdw>
+          </a:effectLst>
+        </a:effectStyle>
+        <a:effectStyle>
+          <a:effectLst>
+            <a:outerShdw blurRad="40000" dist="23000" dir="5400000" rotWithShape="0">
+              <a:srgbClr val="000000">
+                <a:alpha val="35000"/>
+              </a:srgbClr>
+            </a:outerShdw>
+          </a:effectLst>
+        </a:effectStyle>
+        <a:effectStyle>
+          <a:effectLst>
+            <a:outerShdw blurRad="40000" dist="23000" dir="5400000" rotWithShape="0">
+              <a:srgbClr val="000000">
+                <a:alpha val="35000"/>
+              </a:srgbClr>
+            </a:outerShdw>
+          </a:effectLst>
+          <a:scene3d>
+            <a:camera prst="orthographicFront">
+              <a:rot lat="0" lon="0" rev="0"/>
+            </a:camera>
+            <a:lightRig rig="threePt" dir="t">
+              <a:rot lat="0" lon="0" rev="1200000"/>
+            </a:lightRig>
+          </a:scene3d>
+          <a:sp3d>
+            <a:bevelT w="63500" h="25400"/>
+          </a:sp3d>
+        </a:effectStyle>
+      </a:effectStyleLst>
+      <a:bgFillStyleLst>
+        <a:solidFill>
+          <a:schemeClr val="phClr"/>
+        </a:solidFill>
+        <a:gradFill rotWithShape="1">
+          <a:gsLst>
+            <a:gs pos="0">
+              <a:schemeClr val="phClr">
+                <a:tint val="40000"/>
+                <a:satMod val="350000"/>
+              </a:schemeClr>
+            </a:gs>
+            <a:gs pos="40000">
+              <a:schemeClr val="phClr">
+                <a:tint val="45000"/>
+                <a:shade val="99000"/>
+                <a:satMod val="350000"/>
+              </a:schemeClr>
+            </a:gs>
+            <a:gs pos="100000">
+              <a:schemeClr val="phClr">
+                <a:shade val="20000"/>
+                <a:satMod val="255000"/>
+              </a:schemeClr>
+            </a:gs>
+          </a:gsLst>
+          <a:path path="circle">
+            <a:fillToRect l="50000" t="-80000" r="50000" b="180000"/>
+          </a:path>
+        </a:gradFill>
+        <a:gradFill rotWithShape="1">
+          <a:gsLst>
+            <a:gs pos="0">
+              <a:schemeClr val="phClr">
+                <a:tint val="80000"/>
+                <a:satMod val="300000"/>
+              </a:schemeClr>
+            </a:gs>
+            <a:gs pos="100000">
+              <a:schemeClr val="phClr">
+                <a:shade val="30000"/>
+                <a:satMod val="200000"/>
+              </a:schemeClr>
+            </a:gs>
+          </a:gsLst>
+          <a:path path="circle">
+            <a:fillToRect l="50000" t="50000" r="50000" b="50000"/>
+          </a:path>
+        </a:gradFill>
+      </a:bgFillStyleLst>
+    </a:fmtScheme>
+  </a:themeElements>
+</a:theme>
+</file>
+
+<file path=ppt/theme/theme2.xml><?xml version="1.0" encoding="utf-8"?>
 <a:theme xmlns:a="http://schemas.openxmlformats.org/drawingml/2006/main" xmlns:r="http://schemas.openxmlformats.org/officeDocument/2006/relationships">
   <a:themeElements>
     <a:clrScheme name="Default">
@@ -15307,283 +15770,4 @@
     </a:fmtScheme>
   </a:themeElements>
 </a:theme>
-</file>
-
-<file path=ppt/theme/theme2.xml><?xml version="1.0" encoding="utf-8"?>
-<a:theme xmlns:a="http://schemas.openxmlformats.org/drawingml/2006/main" xmlns:r="http://schemas.openxmlformats.org/officeDocument/2006/relationships" name="Live de python">
-  <a:themeElements>
-    <a:clrScheme name="Simple Light">
-      <a:dk1>
-        <a:srgbClr val="2A2A2A"/>
-      </a:dk1>
-      <a:lt1>
-        <a:srgbClr val="FEDD8E"/>
-      </a:lt1>
-      <a:dk2>
-        <a:srgbClr val="FF8E7B"/>
-      </a:dk2>
-      <a:lt2>
-        <a:srgbClr val="2A2A2A"/>
-      </a:lt2>
-      <a:accent1>
-        <a:srgbClr val="FEDD8E"/>
-      </a:accent1>
-      <a:accent2>
-        <a:srgbClr val="FF8E7B"/>
-      </a:accent2>
-      <a:accent3>
-        <a:srgbClr val="2A2A2A"/>
-      </a:accent3>
-      <a:accent4>
-        <a:srgbClr val="FEDD8E"/>
-      </a:accent4>
-      <a:accent5>
-        <a:srgbClr val="FF8E7B"/>
-      </a:accent5>
-      <a:accent6>
-        <a:srgbClr val="FEDD8E"/>
-      </a:accent6>
-      <a:hlink>
-        <a:srgbClr val="2A2A2A"/>
-      </a:hlink>
-      <a:folHlink>
-        <a:srgbClr val="0097A7"/>
-      </a:folHlink>
-    </a:clrScheme>
-    <a:fontScheme name="Office">
-      <a:majorFont>
-        <a:latin typeface="Arial"/>
-        <a:ea typeface=""/>
-        <a:cs typeface=""/>
-        <a:font script="Jpan" typeface="ＭＳ Ｐゴシック"/>
-        <a:font script="Hang" typeface="맑은 고딕"/>
-        <a:font script="Hans" typeface="宋体"/>
-        <a:font script="Hant" typeface="新細明體"/>
-        <a:font script="Arab" typeface="Times New Roman"/>
-        <a:font script="Hebr" typeface="Times New Roman"/>
-        <a:font script="Thai" typeface="Angsana New"/>
-        <a:font script="Ethi" typeface="Nyala"/>
-        <a:font script="Beng" typeface="Vrinda"/>
-        <a:font script="Gujr" typeface="Shruti"/>
-        <a:font script="Khmr" typeface="MoolBoran"/>
-        <a:font script="Knda" typeface="Tunga"/>
-        <a:font script="Guru" typeface="Raavi"/>
-        <a:font script="Cans" typeface="Euphemia"/>
-        <a:font script="Cher" typeface="Plantagenet Cherokee"/>
-        <a:font script="Yiii" typeface="Microsoft Yi Baiti"/>
-        <a:font script="Tibt" typeface="Microsoft Himalaya"/>
-        <a:font script="Thaa" typeface="MV Boli"/>
-        <a:font script="Deva" typeface="Mangal"/>
-        <a:font script="Telu" typeface="Gautami"/>
-        <a:font script="Taml" typeface="Latha"/>
-        <a:font script="Syrc" typeface="Estrangelo Edessa"/>
-        <a:font script="Orya" typeface="Kalinga"/>
-        <a:font script="Mlym" typeface="Kartika"/>
-        <a:font script="Laoo" typeface="DokChampa"/>
-        <a:font script="Sinh" typeface="Iskoola Pota"/>
-        <a:font script="Mong" typeface="Mongolian Baiti"/>
-        <a:font script="Viet" typeface="Times New Roman"/>
-        <a:font script="Uigh" typeface="Microsoft Uighur"/>
-        <a:font script="Geor" typeface="Sylfaen"/>
-      </a:majorFont>
-      <a:minorFont>
-        <a:latin typeface="Arial"/>
-        <a:ea typeface=""/>
-        <a:cs typeface=""/>
-        <a:font script="Jpan" typeface="ＭＳ Ｐゴシック"/>
-        <a:font script="Hang" typeface="맑은 고딕"/>
-        <a:font script="Hans" typeface="宋体"/>
-        <a:font script="Hant" typeface="新細明體"/>
-        <a:font script="Arab" typeface="Arial"/>
-        <a:font script="Hebr" typeface="Arial"/>
-        <a:font script="Thai" typeface="Cordia New"/>
-        <a:font script="Ethi" typeface="Nyala"/>
-        <a:font script="Beng" typeface="Vrinda"/>
-        <a:font script="Gujr" typeface="Shruti"/>
-        <a:font script="Khmr" typeface="DaunPenh"/>
-        <a:font script="Knda" typeface="Tunga"/>
-        <a:font script="Guru" typeface="Raavi"/>
-        <a:font script="Cans" typeface="Euphemia"/>
-        <a:font script="Cher" typeface="Plantagenet Cherokee"/>
-        <a:font script="Yiii" typeface="Microsoft Yi Baiti"/>
-        <a:font script="Tibt" typeface="Microsoft Himalaya"/>
-        <a:font script="Thaa" typeface="MV Boli"/>
-        <a:font script="Deva" typeface="Mangal"/>
-        <a:font script="Telu" typeface="Gautami"/>
-        <a:font script="Taml" typeface="Latha"/>
-        <a:font script="Syrc" typeface="Estrangelo Edessa"/>
-        <a:font script="Orya" typeface="Kalinga"/>
-        <a:font script="Mlym" typeface="Kartika"/>
-        <a:font script="Laoo" typeface="DokChampa"/>
-        <a:font script="Sinh" typeface="Iskoola Pota"/>
-        <a:font script="Mong" typeface="Mongolian Baiti"/>
-        <a:font script="Viet" typeface="Arial"/>
-        <a:font script="Uigh" typeface="Microsoft Uighur"/>
-        <a:font script="Geor" typeface="Sylfaen"/>
-      </a:minorFont>
-    </a:fontScheme>
-    <a:fmtScheme name="Office">
-      <a:fillStyleLst>
-        <a:solidFill>
-          <a:schemeClr val="phClr"/>
-        </a:solidFill>
-        <a:gradFill rotWithShape="1">
-          <a:gsLst>
-            <a:gs pos="0">
-              <a:schemeClr val="phClr">
-                <a:tint val="50000"/>
-                <a:satMod val="300000"/>
-              </a:schemeClr>
-            </a:gs>
-            <a:gs pos="35000">
-              <a:schemeClr val="phClr">
-                <a:tint val="37000"/>
-                <a:satMod val="300000"/>
-              </a:schemeClr>
-            </a:gs>
-            <a:gs pos="100000">
-              <a:schemeClr val="phClr">
-                <a:tint val="15000"/>
-                <a:satMod val="350000"/>
-              </a:schemeClr>
-            </a:gs>
-          </a:gsLst>
-          <a:lin ang="16200000" scaled="1"/>
-        </a:gradFill>
-        <a:gradFill rotWithShape="1">
-          <a:gsLst>
-            <a:gs pos="0">
-              <a:schemeClr val="phClr">
-                <a:tint val="100000"/>
-                <a:shade val="100000"/>
-                <a:satMod val="130000"/>
-              </a:schemeClr>
-            </a:gs>
-            <a:gs pos="100000">
-              <a:schemeClr val="phClr">
-                <a:tint val="50000"/>
-                <a:shade val="100000"/>
-                <a:satMod val="350000"/>
-              </a:schemeClr>
-            </a:gs>
-          </a:gsLst>
-          <a:lin ang="16200000" scaled="0"/>
-        </a:gradFill>
-      </a:fillStyleLst>
-      <a:lnStyleLst>
-        <a:ln w="9525" cap="flat" cmpd="sng" algn="ctr">
-          <a:solidFill>
-            <a:schemeClr val="phClr">
-              <a:shade val="95000"/>
-              <a:satMod val="105000"/>
-            </a:schemeClr>
-          </a:solidFill>
-          <a:prstDash val="solid"/>
-        </a:ln>
-        <a:ln w="25400" cap="flat" cmpd="sng" algn="ctr">
-          <a:solidFill>
-            <a:schemeClr val="phClr"/>
-          </a:solidFill>
-          <a:prstDash val="solid"/>
-        </a:ln>
-        <a:ln w="38100" cap="flat" cmpd="sng" algn="ctr">
-          <a:solidFill>
-            <a:schemeClr val="phClr"/>
-          </a:solidFill>
-          <a:prstDash val="solid"/>
-        </a:ln>
-      </a:lnStyleLst>
-      <a:effectStyleLst>
-        <a:effectStyle>
-          <a:effectLst>
-            <a:outerShdw blurRad="40000" dist="20000" dir="5400000" rotWithShape="0">
-              <a:srgbClr val="000000">
-                <a:alpha val="38000"/>
-              </a:srgbClr>
-            </a:outerShdw>
-          </a:effectLst>
-        </a:effectStyle>
-        <a:effectStyle>
-          <a:effectLst>
-            <a:outerShdw blurRad="40000" dist="23000" dir="5400000" rotWithShape="0">
-              <a:srgbClr val="000000">
-                <a:alpha val="35000"/>
-              </a:srgbClr>
-            </a:outerShdw>
-          </a:effectLst>
-        </a:effectStyle>
-        <a:effectStyle>
-          <a:effectLst>
-            <a:outerShdw blurRad="40000" dist="23000" dir="5400000" rotWithShape="0">
-              <a:srgbClr val="000000">
-                <a:alpha val="35000"/>
-              </a:srgbClr>
-            </a:outerShdw>
-          </a:effectLst>
-          <a:scene3d>
-            <a:camera prst="orthographicFront">
-              <a:rot lat="0" lon="0" rev="0"/>
-            </a:camera>
-            <a:lightRig rig="threePt" dir="t">
-              <a:rot lat="0" lon="0" rev="1200000"/>
-            </a:lightRig>
-          </a:scene3d>
-          <a:sp3d>
-            <a:bevelT w="63500" h="25400"/>
-          </a:sp3d>
-        </a:effectStyle>
-      </a:effectStyleLst>
-      <a:bgFillStyleLst>
-        <a:solidFill>
-          <a:schemeClr val="phClr"/>
-        </a:solidFill>
-        <a:gradFill rotWithShape="1">
-          <a:gsLst>
-            <a:gs pos="0">
-              <a:schemeClr val="phClr">
-                <a:tint val="40000"/>
-                <a:satMod val="350000"/>
-              </a:schemeClr>
-            </a:gs>
-            <a:gs pos="40000">
-              <a:schemeClr val="phClr">
-                <a:tint val="45000"/>
-                <a:shade val="99000"/>
-                <a:satMod val="350000"/>
-              </a:schemeClr>
-            </a:gs>
-            <a:gs pos="100000">
-              <a:schemeClr val="phClr">
-                <a:shade val="20000"/>
-                <a:satMod val="255000"/>
-              </a:schemeClr>
-            </a:gs>
-          </a:gsLst>
-          <a:path path="circle">
-            <a:fillToRect l="50000" t="-80000" r="50000" b="180000"/>
-          </a:path>
-        </a:gradFill>
-        <a:gradFill rotWithShape="1">
-          <a:gsLst>
-            <a:gs pos="0">
-              <a:schemeClr val="phClr">
-                <a:tint val="80000"/>
-                <a:satMod val="300000"/>
-              </a:schemeClr>
-            </a:gs>
-            <a:gs pos="100000">
-              <a:schemeClr val="phClr">
-                <a:shade val="30000"/>
-                <a:satMod val="200000"/>
-              </a:schemeClr>
-            </a:gs>
-          </a:gsLst>
-          <a:path path="circle">
-            <a:fillToRect l="50000" t="50000" r="50000" b="50000"/>
-          </a:path>
-        </a:gradFill>
-      </a:bgFillStyleLst>
-    </a:fmtScheme>
-  </a:themeElements>
-</a:theme>
 </file>
</xml_diff>